<commit_message>
nested routes and catch all routes
</commit_message>
<xml_diff>
--- a/NEXT.pptx
+++ b/NEXT.pptx
@@ -5,7 +5,7 @@
     <p:sldMasterId id="2147483690" r:id="rId1"/>
   </p:sldMasterIdLst>
   <p:notesMasterIdLst>
-    <p:notesMasterId r:id="rId9"/>
+    <p:notesMasterId r:id="rId12"/>
   </p:notesMasterIdLst>
   <p:sldIdLst>
     <p:sldId id="256" r:id="rId2"/>
@@ -15,6 +15,9 @@
     <p:sldId id="261" r:id="rId6"/>
     <p:sldId id="262" r:id="rId7"/>
     <p:sldId id="263" r:id="rId8"/>
+    <p:sldId id="264" r:id="rId9"/>
+    <p:sldId id="265" r:id="rId10"/>
+    <p:sldId id="266" r:id="rId11"/>
   </p:sldIdLst>
   <p:sldSz cx="12192000" cy="6858000"/>
   <p:notesSz cx="6858000" cy="9144000"/>
@@ -203,7 +206,7 @@
           <a:p>
             <a:fld id="{9763D4A8-E6B7-4733-A8D3-B38587EC5662}" type="datetimeFigureOut">
               <a:rPr lang="en-US" smtClean="0"/>
-              <a:t>12/23/2022</a:t>
+              <a:t>12/24/2022</a:t>
             </a:fld>
             <a:endParaRPr lang="en-US"/>
           </a:p>
@@ -744,7 +747,7 @@
           <a:p>
             <a:fld id="{1222F12B-E24C-4FA9-96CE-E3C4C7F08EF2}" type="datetimeFigureOut">
               <a:rPr lang="en-US" smtClean="0"/>
-              <a:t>12/23/2022</a:t>
+              <a:t>12/24/2022</a:t>
             </a:fld>
             <a:endParaRPr lang="en-US"/>
           </a:p>
@@ -1158,7 +1161,7 @@
           <a:p>
             <a:fld id="{1222F12B-E24C-4FA9-96CE-E3C4C7F08EF2}" type="datetimeFigureOut">
               <a:rPr lang="en-US" smtClean="0"/>
-              <a:t>12/23/2022</a:t>
+              <a:t>12/24/2022</a:t>
             </a:fld>
             <a:endParaRPr lang="en-US"/>
           </a:p>
@@ -1494,7 +1497,7 @@
           <a:p>
             <a:fld id="{1222F12B-E24C-4FA9-96CE-E3C4C7F08EF2}" type="datetimeFigureOut">
               <a:rPr lang="en-US" smtClean="0"/>
-              <a:t>12/23/2022</a:t>
+              <a:t>12/24/2022</a:t>
             </a:fld>
             <a:endParaRPr lang="en-US"/>
           </a:p>
@@ -1899,7 +1902,7 @@
           <a:p>
             <a:fld id="{1222F12B-E24C-4FA9-96CE-E3C4C7F08EF2}" type="datetimeFigureOut">
               <a:rPr lang="en-US" smtClean="0"/>
-              <a:t>12/23/2022</a:t>
+              <a:t>12/24/2022</a:t>
             </a:fld>
             <a:endParaRPr lang="en-US"/>
           </a:p>
@@ -2467,7 +2470,7 @@
           <a:p>
             <a:fld id="{1222F12B-E24C-4FA9-96CE-E3C4C7F08EF2}" type="datetimeFigureOut">
               <a:rPr lang="en-US" smtClean="0"/>
-              <a:t>12/23/2022</a:t>
+              <a:t>12/24/2022</a:t>
             </a:fld>
             <a:endParaRPr lang="en-US"/>
           </a:p>
@@ -3148,7 +3151,7 @@
           <a:p>
             <a:fld id="{1222F12B-E24C-4FA9-96CE-E3C4C7F08EF2}" type="datetimeFigureOut">
               <a:rPr lang="en-US" smtClean="0"/>
-              <a:t>12/23/2022</a:t>
+              <a:t>12/24/2022</a:t>
             </a:fld>
             <a:endParaRPr lang="en-US"/>
           </a:p>
@@ -4061,7 +4064,7 @@
           <a:p>
             <a:fld id="{1222F12B-E24C-4FA9-96CE-E3C4C7F08EF2}" type="datetimeFigureOut">
               <a:rPr lang="en-US" smtClean="0"/>
-              <a:t>12/23/2022</a:t>
+              <a:t>12/24/2022</a:t>
             </a:fld>
             <a:endParaRPr lang="en-US"/>
           </a:p>
@@ -4374,7 +4377,7 @@
           <a:p>
             <a:fld id="{1222F12B-E24C-4FA9-96CE-E3C4C7F08EF2}" type="datetimeFigureOut">
               <a:rPr lang="en-US" smtClean="0"/>
-              <a:t>12/23/2022</a:t>
+              <a:t>12/24/2022</a:t>
             </a:fld>
             <a:endParaRPr lang="en-US"/>
           </a:p>
@@ -4638,7 +4641,7 @@
           <a:p>
             <a:fld id="{1222F12B-E24C-4FA9-96CE-E3C4C7F08EF2}" type="datetimeFigureOut">
               <a:rPr lang="en-US" smtClean="0"/>
-              <a:t>12/23/2022</a:t>
+              <a:t>12/24/2022</a:t>
             </a:fld>
             <a:endParaRPr lang="en-US"/>
           </a:p>
@@ -4961,7 +4964,7 @@
           <a:p>
             <a:fld id="{1222F12B-E24C-4FA9-96CE-E3C4C7F08EF2}" type="datetimeFigureOut">
               <a:rPr lang="en-US" smtClean="0"/>
-              <a:t>12/23/2022</a:t>
+              <a:t>12/24/2022</a:t>
             </a:fld>
             <a:endParaRPr lang="en-US"/>
           </a:p>
@@ -5350,7 +5353,7 @@
           <a:p>
             <a:fld id="{1222F12B-E24C-4FA9-96CE-E3C4C7F08EF2}" type="datetimeFigureOut">
               <a:rPr lang="en-US" smtClean="0"/>
-              <a:t>12/23/2022</a:t>
+              <a:t>12/24/2022</a:t>
             </a:fld>
             <a:endParaRPr lang="en-US"/>
           </a:p>
@@ -5726,7 +5729,7 @@
           <a:p>
             <a:fld id="{1222F12B-E24C-4FA9-96CE-E3C4C7F08EF2}" type="datetimeFigureOut">
               <a:rPr lang="en-US" smtClean="0"/>
-              <a:t>12/23/2022</a:t>
+              <a:t>12/24/2022</a:t>
             </a:fld>
             <a:endParaRPr lang="en-US"/>
           </a:p>
@@ -6232,7 +6235,7 @@
           <a:p>
             <a:fld id="{1222F12B-E24C-4FA9-96CE-E3C4C7F08EF2}" type="datetimeFigureOut">
               <a:rPr lang="en-US" smtClean="0"/>
-              <a:t>12/23/2022</a:t>
+              <a:t>12/24/2022</a:t>
             </a:fld>
             <a:endParaRPr lang="en-US"/>
           </a:p>
@@ -6489,7 +6492,7 @@
           <a:p>
             <a:fld id="{1222F12B-E24C-4FA9-96CE-E3C4C7F08EF2}" type="datetimeFigureOut">
               <a:rPr lang="en-US" smtClean="0"/>
-              <a:t>12/23/2022</a:t>
+              <a:t>12/24/2022</a:t>
             </a:fld>
             <a:endParaRPr lang="en-US"/>
           </a:p>
@@ -6652,7 +6655,7 @@
           <a:p>
             <a:fld id="{1222F12B-E24C-4FA9-96CE-E3C4C7F08EF2}" type="datetimeFigureOut">
               <a:rPr lang="en-US" smtClean="0"/>
-              <a:t>12/23/2022</a:t>
+              <a:t>12/24/2022</a:t>
             </a:fld>
             <a:endParaRPr lang="en-US"/>
           </a:p>
@@ -7042,7 +7045,7 @@
           <a:p>
             <a:fld id="{1222F12B-E24C-4FA9-96CE-E3C4C7F08EF2}" type="datetimeFigureOut">
               <a:rPr lang="en-US" smtClean="0"/>
-              <a:t>12/23/2022</a:t>
+              <a:t>12/24/2022</a:t>
             </a:fld>
             <a:endParaRPr lang="en-US"/>
           </a:p>
@@ -7451,7 +7454,7 @@
           <a:p>
             <a:fld id="{1222F12B-E24C-4FA9-96CE-E3C4C7F08EF2}" type="datetimeFigureOut">
               <a:rPr lang="en-US" smtClean="0"/>
-              <a:t>12/23/2022</a:t>
+              <a:t>12/24/2022</a:t>
             </a:fld>
             <a:endParaRPr lang="en-US"/>
           </a:p>
@@ -7695,7 +7698,7 @@
           <a:p>
             <a:fld id="{1222F12B-E24C-4FA9-96CE-E3C4C7F08EF2}" type="datetimeFigureOut">
               <a:rPr lang="en-US" smtClean="0"/>
-              <a:t>12/23/2022</a:t>
+              <a:t>12/24/2022</a:t>
             </a:fld>
             <a:endParaRPr lang="en-US"/>
           </a:p>
@@ -8190,6 +8193,71 @@
     <p:extLst>
       <p:ext uri="{BB962C8B-B14F-4D97-AF65-F5344CB8AC3E}">
         <p14:creationId xmlns:p14="http://schemas.microsoft.com/office/powerpoint/2010/main" val="2342363272"/>
+      </p:ext>
+    </p:extLst>
+  </p:cSld>
+  <p:clrMapOvr>
+    <a:masterClrMapping/>
+  </p:clrMapOvr>
+</p:sld>
+</file>
+
+<file path=ppt/slides/slide10.xml><?xml version="1.0" encoding="utf-8"?>
+<p:sld xmlns:a="http://schemas.openxmlformats.org/drawingml/2006/main" xmlns:r="http://schemas.openxmlformats.org/officeDocument/2006/relationships" xmlns:p="http://schemas.openxmlformats.org/presentationml/2006/main">
+  <p:cSld>
+    <p:spTree>
+      <p:nvGrpSpPr>
+        <p:cNvPr id="1" name=""/>
+        <p:cNvGrpSpPr/>
+        <p:nvPr/>
+      </p:nvGrpSpPr>
+      <p:grpSpPr>
+        <a:xfrm>
+          <a:off x="0" y="0"/>
+          <a:ext cx="0" cy="0"/>
+          <a:chOff x="0" y="0"/>
+          <a:chExt cx="0" cy="0"/>
+        </a:xfrm>
+      </p:grpSpPr>
+      <p:sp>
+        <p:nvSpPr>
+          <p:cNvPr id="2" name="TextBox 1">
+            <a:extLst>
+              <a:ext uri="{FF2B5EF4-FFF2-40B4-BE49-F238E27FC236}">
+                <a16:creationId xmlns:a16="http://schemas.microsoft.com/office/drawing/2014/main" id="{E8083E0F-A665-DA7A-623E-C6F328E679C3}"/>
+              </a:ext>
+            </a:extLst>
+          </p:cNvPr>
+          <p:cNvSpPr txBox="1"/>
+          <p:nvPr/>
+        </p:nvSpPr>
+        <p:spPr>
+          <a:xfrm>
+            <a:off x="361950" y="600075"/>
+            <a:ext cx="9705975" cy="646331"/>
+          </a:xfrm>
+          <a:prstGeom prst="rect">
+            <a:avLst/>
+          </a:prstGeom>
+          <a:noFill/>
+        </p:spPr>
+        <p:txBody>
+          <a:bodyPr wrap="square" rtlCol="0">
+            <a:spAutoFit/>
+          </a:bodyPr>
+          <a:lstStyle/>
+          <a:p>
+            <a:r>
+              <a:rPr lang="en-US" dirty="0"/>
+              <a:t>If we search localhost:3000/blogs =&gt; error 404 not found for fix this use optional catch all routes =&gt; we must convert […params].js to [[…params]].js =&gt; so this is fix</a:t>
+            </a:r>
+          </a:p>
+        </p:txBody>
+      </p:sp>
+    </p:spTree>
+    <p:extLst>
+      <p:ext uri="{BB962C8B-B14F-4D97-AF65-F5344CB8AC3E}">
+        <p14:creationId xmlns:p14="http://schemas.microsoft.com/office/powerpoint/2010/main" val="672524299"/>
       </p:ext>
     </p:extLst>
   </p:cSld>
@@ -10745,7 +10813,7 @@
         <p:spPr>
           <a:xfrm>
             <a:off x="373810" y="4787660"/>
-            <a:ext cx="9333781" cy="1323439"/>
+            <a:ext cx="9333781" cy="1877437"/>
           </a:xfrm>
           <a:prstGeom prst="rect">
             <a:avLst/>
@@ -10770,7 +10838,7 @@
             </a:r>
           </a:p>
           <a:p>
-            <a:endParaRPr lang="en-US" sz="800" dirty="0">
+            <a:endParaRPr lang="en-US" sz="1200" dirty="0">
               <a:solidFill>
                 <a:schemeClr val="tx1">
                   <a:lumMod val="50000"/>
@@ -10780,7 +10848,7 @@
           </a:p>
           <a:p>
             <a:r>
-              <a:rPr lang="en-US" sz="800" dirty="0">
+              <a:rPr lang="en-US" sz="1200" dirty="0">
                 <a:solidFill>
                   <a:srgbClr val="0070C0"/>
                 </a:solidFill>
@@ -10788,7 +10856,7 @@
               <a:t>Import {</a:t>
             </a:r>
             <a:r>
-              <a:rPr lang="en-US" sz="800" dirty="0" err="1">
+              <a:rPr lang="en-US" sz="1200" dirty="0" err="1">
                 <a:solidFill>
                   <a:srgbClr val="0070C0"/>
                 </a:solidFill>
@@ -10796,7 +10864,7 @@
               <a:t>useRouter</a:t>
             </a:r>
             <a:r>
-              <a:rPr lang="en-US" sz="800" dirty="0">
+              <a:rPr lang="en-US" sz="1200" dirty="0">
                 <a:solidFill>
                   <a:srgbClr val="0070C0"/>
                 </a:solidFill>
@@ -10805,7 +10873,7 @@
             </a:r>
           </a:p>
           <a:p>
-            <a:endParaRPr lang="en-US" sz="800" dirty="0">
+            <a:endParaRPr lang="en-US" sz="1200" dirty="0">
               <a:solidFill>
                 <a:srgbClr val="0070C0"/>
               </a:solidFill>
@@ -10813,7 +10881,7 @@
           </a:p>
           <a:p>
             <a:r>
-              <a:rPr lang="en-US" sz="800" dirty="0">
+              <a:rPr lang="en-US" sz="1200" dirty="0">
                 <a:solidFill>
                   <a:srgbClr val="0070C0"/>
                 </a:solidFill>
@@ -10823,7 +10891,7 @@
           </a:p>
           <a:p>
             <a:r>
-              <a:rPr lang="en-US" sz="800" dirty="0">
+              <a:rPr lang="en-US" sz="1200" dirty="0">
                 <a:solidFill>
                   <a:srgbClr val="0070C0"/>
                 </a:solidFill>
@@ -10831,7 +10899,7 @@
               <a:t>	const router = </a:t>
             </a:r>
             <a:r>
-              <a:rPr lang="en-US" sz="800" dirty="0" err="1">
+              <a:rPr lang="en-US" sz="1200" dirty="0" err="1">
                 <a:solidFill>
                   <a:srgbClr val="0070C0"/>
                 </a:solidFill>
@@ -10839,7 +10907,7 @@
               <a:t>useRouter</a:t>
             </a:r>
             <a:r>
-              <a:rPr lang="en-US" sz="800" dirty="0">
+              <a:rPr lang="en-US" sz="1200" dirty="0">
                 <a:solidFill>
                   <a:srgbClr val="0070C0"/>
                 </a:solidFill>
@@ -10849,7 +10917,7 @@
           </a:p>
           <a:p>
             <a:r>
-              <a:rPr lang="en-US" sz="800" dirty="0">
+              <a:rPr lang="en-US" sz="1200" dirty="0">
                 <a:solidFill>
                   <a:srgbClr val="0070C0"/>
                 </a:solidFill>
@@ -10857,7 +10925,7 @@
               <a:t>	const {</a:t>
             </a:r>
             <a:r>
-              <a:rPr lang="en-US" sz="800" dirty="0" err="1">
+              <a:rPr lang="en-US" sz="1200" dirty="0" err="1">
                 <a:solidFill>
                   <a:srgbClr val="0070C0"/>
                 </a:solidFill>
@@ -10865,7 +10933,7 @@
               <a:t>postId</a:t>
             </a:r>
             <a:r>
-              <a:rPr lang="en-US" sz="800" dirty="0">
+              <a:rPr lang="en-US" sz="1200" dirty="0">
                 <a:solidFill>
                   <a:srgbClr val="0070C0"/>
                 </a:solidFill>
@@ -10873,7 +10941,7 @@
               <a:t>} = </a:t>
             </a:r>
             <a:r>
-              <a:rPr lang="en-US" sz="800" dirty="0" err="1">
+              <a:rPr lang="en-US" sz="1200" dirty="0" err="1">
                 <a:solidFill>
                   <a:srgbClr val="0070C0"/>
                 </a:solidFill>
@@ -10881,7 +10949,7 @@
               <a:t>router.query</a:t>
             </a:r>
             <a:r>
-              <a:rPr lang="en-US" sz="800" dirty="0">
+              <a:rPr lang="en-US" sz="1200" dirty="0">
                 <a:solidFill>
                   <a:srgbClr val="0070C0"/>
                 </a:solidFill>
@@ -10891,7 +10959,7 @@
           </a:p>
           <a:p>
             <a:r>
-              <a:rPr lang="en-US" sz="800" dirty="0">
+              <a:rPr lang="en-US" sz="1200" dirty="0">
                 <a:solidFill>
                   <a:srgbClr val="0070C0"/>
                 </a:solidFill>
@@ -10899,7 +10967,7 @@
               <a:t>	return &lt;h1&gt;post page {</a:t>
             </a:r>
             <a:r>
-              <a:rPr lang="en-US" sz="800" dirty="0" err="1">
+              <a:rPr lang="en-US" sz="1200" dirty="0" err="1">
                 <a:solidFill>
                   <a:srgbClr val="0070C0"/>
                 </a:solidFill>
@@ -10907,7 +10975,7 @@
               <a:t>postId</a:t>
             </a:r>
             <a:r>
-              <a:rPr lang="en-US" sz="800" dirty="0">
+              <a:rPr lang="en-US" sz="1200" dirty="0">
                 <a:solidFill>
                   <a:srgbClr val="0070C0"/>
                 </a:solidFill>
@@ -10915,7 +10983,7 @@
               <a:t>}&lt;/h1&gt; </a:t>
             </a:r>
             <a:r>
-              <a:rPr lang="en-US" sz="800" dirty="0">
+              <a:rPr lang="en-US" sz="1200" dirty="0">
                 <a:solidFill>
                   <a:srgbClr val="92D050"/>
                 </a:solidFill>
@@ -10925,7 +10993,7 @@
           </a:p>
           <a:p>
             <a:r>
-              <a:rPr lang="en-US" sz="800" dirty="0">
+              <a:rPr lang="en-US" sz="1200" dirty="0">
                 <a:solidFill>
                   <a:srgbClr val="0070C0"/>
                 </a:solidFill>
@@ -10935,7 +11003,7 @@
           </a:p>
           <a:p>
             <a:r>
-              <a:rPr lang="en-US" sz="800" dirty="0">
+              <a:rPr lang="en-US" sz="1200" dirty="0">
                 <a:solidFill>
                   <a:srgbClr val="0070C0"/>
                 </a:solidFill>
@@ -10949,6 +11017,780 @@
     <p:extLst>
       <p:ext uri="{BB962C8B-B14F-4D97-AF65-F5344CB8AC3E}">
         <p14:creationId xmlns:p14="http://schemas.microsoft.com/office/powerpoint/2010/main" val="713946859"/>
+      </p:ext>
+    </p:extLst>
+  </p:cSld>
+  <p:clrMapOvr>
+    <a:masterClrMapping/>
+  </p:clrMapOvr>
+</p:sld>
+</file>
+
+<file path=ppt/slides/slide8.xml><?xml version="1.0" encoding="utf-8"?>
+<p:sld xmlns:a="http://schemas.openxmlformats.org/drawingml/2006/main" xmlns:r="http://schemas.openxmlformats.org/officeDocument/2006/relationships" xmlns:p="http://schemas.openxmlformats.org/presentationml/2006/main">
+  <p:cSld>
+    <p:spTree>
+      <p:nvGrpSpPr>
+        <p:cNvPr id="1" name=""/>
+        <p:cNvGrpSpPr/>
+        <p:nvPr/>
+      </p:nvGrpSpPr>
+      <p:grpSpPr>
+        <a:xfrm>
+          <a:off x="0" y="0"/>
+          <a:ext cx="0" cy="0"/>
+          <a:chOff x="0" y="0"/>
+          <a:chExt cx="0" cy="0"/>
+        </a:xfrm>
+      </p:grpSpPr>
+      <p:sp>
+        <p:nvSpPr>
+          <p:cNvPr id="2" name="Title 1">
+            <a:extLst>
+              <a:ext uri="{FF2B5EF4-FFF2-40B4-BE49-F238E27FC236}">
+                <a16:creationId xmlns:a16="http://schemas.microsoft.com/office/drawing/2014/main" id="{149E52C4-3BA9-1F1A-F03F-D3787C7CE2D4}"/>
+              </a:ext>
+            </a:extLst>
+          </p:cNvPr>
+          <p:cNvSpPr>
+            <a:spLocks noGrp="1"/>
+          </p:cNvSpPr>
+          <p:nvPr>
+            <p:ph type="title"/>
+          </p:nvPr>
+        </p:nvSpPr>
+        <p:spPr/>
+        <p:txBody>
+          <a:bodyPr/>
+          <a:lstStyle/>
+          <a:p>
+            <a:r>
+              <a:rPr lang="en-US" dirty="0"/>
+              <a:t>Nested dynamic Routing </a:t>
+            </a:r>
+          </a:p>
+        </p:txBody>
+      </p:sp>
+      <p:sp>
+        <p:nvSpPr>
+          <p:cNvPr id="3" name="TextBox 2">
+            <a:extLst>
+              <a:ext uri="{FF2B5EF4-FFF2-40B4-BE49-F238E27FC236}">
+                <a16:creationId xmlns:a16="http://schemas.microsoft.com/office/drawing/2014/main" id="{6B85F3BB-DEB8-21C8-E116-9C96C187A22A}"/>
+              </a:ext>
+            </a:extLst>
+          </p:cNvPr>
+          <p:cNvSpPr txBox="1"/>
+          <p:nvPr/>
+        </p:nvSpPr>
+        <p:spPr>
+          <a:xfrm>
+            <a:off x="427703" y="2433484"/>
+            <a:ext cx="9468465" cy="3139321"/>
+          </a:xfrm>
+          <a:prstGeom prst="rect">
+            <a:avLst/>
+          </a:prstGeom>
+          <a:noFill/>
+        </p:spPr>
+        <p:txBody>
+          <a:bodyPr wrap="square" rtlCol="0">
+            <a:spAutoFit/>
+          </a:bodyPr>
+          <a:lstStyle/>
+          <a:p>
+            <a:r>
+              <a:rPr lang="en-US" dirty="0"/>
+              <a:t>Like localhost:3000/post/2/10</a:t>
+            </a:r>
+          </a:p>
+          <a:p>
+            <a:endParaRPr lang="en-US" dirty="0"/>
+          </a:p>
+          <a:p>
+            <a:r>
+              <a:rPr lang="en-US" dirty="0"/>
+              <a:t>So : create [</a:t>
+            </a:r>
+            <a:r>
+              <a:rPr lang="en-US" dirty="0" err="1"/>
+              <a:t>postId</a:t>
+            </a:r>
+            <a:r>
+              <a:rPr lang="en-US" dirty="0"/>
+              <a:t>] folder in posts folder and create index.js so search  localhost:3000/posts/1 see post if we want review localhost:3000/posts/review/1 =&gt; create review folder in [</a:t>
+            </a:r>
+            <a:r>
+              <a:rPr lang="en-US" dirty="0" err="1"/>
+              <a:t>postId</a:t>
+            </a:r>
+            <a:r>
+              <a:rPr lang="en-US" dirty="0"/>
+              <a:t>] folder and create index.js or [reviewId].js  </a:t>
+            </a:r>
+          </a:p>
+          <a:p>
+            <a:endParaRPr lang="en-US" dirty="0"/>
+          </a:p>
+          <a:p>
+            <a:r>
+              <a:rPr lang="en-US" dirty="0"/>
+              <a:t>Notice : if we want query set we need  same like name of  folder</a:t>
+            </a:r>
+          </a:p>
+          <a:p>
+            <a:endParaRPr lang="en-US" dirty="0"/>
+          </a:p>
+          <a:p>
+            <a:r>
+              <a:rPr lang="en-US" dirty="0"/>
+              <a:t>Localhost:3000/posts/2?sort=</a:t>
+            </a:r>
+            <a:r>
+              <a:rPr lang="en-US" dirty="0" err="1"/>
+              <a:t>last&amp;page</a:t>
+            </a:r>
+            <a:r>
+              <a:rPr lang="en-US" dirty="0"/>
+              <a:t>=1 </a:t>
+            </a:r>
+          </a:p>
+          <a:p>
+            <a:endParaRPr lang="en-US" dirty="0"/>
+          </a:p>
+          <a:p>
+            <a:r>
+              <a:rPr lang="en-US" dirty="0"/>
+              <a:t>In </a:t>
+            </a:r>
+            <a:r>
+              <a:rPr lang="en-US" dirty="0" err="1"/>
+              <a:t>router.query</a:t>
+            </a:r>
+            <a:r>
+              <a:rPr lang="en-US" dirty="0"/>
+              <a:t> = &gt; {</a:t>
+            </a:r>
+            <a:r>
+              <a:rPr lang="en-US" dirty="0" err="1"/>
+              <a:t>postId</a:t>
+            </a:r>
+            <a:r>
+              <a:rPr lang="en-US" dirty="0"/>
+              <a:t> : 2 , sort : last , page : 1}</a:t>
+            </a:r>
+          </a:p>
+        </p:txBody>
+      </p:sp>
+    </p:spTree>
+    <p:extLst>
+      <p:ext uri="{BB962C8B-B14F-4D97-AF65-F5344CB8AC3E}">
+        <p14:creationId xmlns:p14="http://schemas.microsoft.com/office/powerpoint/2010/main" val="2696409632"/>
+      </p:ext>
+    </p:extLst>
+  </p:cSld>
+  <p:clrMapOvr>
+    <a:masterClrMapping/>
+  </p:clrMapOvr>
+</p:sld>
+</file>
+
+<file path=ppt/slides/slide9.xml><?xml version="1.0" encoding="utf-8"?>
+<p:sld xmlns:a="http://schemas.openxmlformats.org/drawingml/2006/main" xmlns:r="http://schemas.openxmlformats.org/officeDocument/2006/relationships" xmlns:p="http://schemas.openxmlformats.org/presentationml/2006/main">
+  <p:cSld>
+    <p:spTree>
+      <p:nvGrpSpPr>
+        <p:cNvPr id="1" name=""/>
+        <p:cNvGrpSpPr/>
+        <p:nvPr/>
+      </p:nvGrpSpPr>
+      <p:grpSpPr>
+        <a:xfrm>
+          <a:off x="0" y="0"/>
+          <a:ext cx="0" cy="0"/>
+          <a:chOff x="0" y="0"/>
+          <a:chExt cx="0" cy="0"/>
+        </a:xfrm>
+      </p:grpSpPr>
+      <p:sp>
+        <p:nvSpPr>
+          <p:cNvPr id="2" name="Title 1">
+            <a:extLst>
+              <a:ext uri="{FF2B5EF4-FFF2-40B4-BE49-F238E27FC236}">
+                <a16:creationId xmlns:a16="http://schemas.microsoft.com/office/drawing/2014/main" id="{541B5318-6CC6-AFE0-4F26-318A01282577}"/>
+              </a:ext>
+            </a:extLst>
+          </p:cNvPr>
+          <p:cNvSpPr>
+            <a:spLocks noGrp="1"/>
+          </p:cNvSpPr>
+          <p:nvPr>
+            <p:ph type="title"/>
+          </p:nvPr>
+        </p:nvSpPr>
+        <p:spPr/>
+        <p:txBody>
+          <a:bodyPr/>
+          <a:lstStyle/>
+          <a:p>
+            <a:r>
+              <a:rPr lang="en-US" dirty="0"/>
+              <a:t>Catch all Routes</a:t>
+            </a:r>
+          </a:p>
+        </p:txBody>
+      </p:sp>
+      <p:sp>
+        <p:nvSpPr>
+          <p:cNvPr id="3" name="TextBox 2">
+            <a:extLst>
+              <a:ext uri="{FF2B5EF4-FFF2-40B4-BE49-F238E27FC236}">
+                <a16:creationId xmlns:a16="http://schemas.microsoft.com/office/drawing/2014/main" id="{2A54CA1F-DF7D-ABC9-FEFC-26C8FC91AFC5}"/>
+              </a:ext>
+            </a:extLst>
+          </p:cNvPr>
+          <p:cNvSpPr txBox="1"/>
+          <p:nvPr/>
+        </p:nvSpPr>
+        <p:spPr>
+          <a:xfrm>
+            <a:off x="634181" y="2344994"/>
+            <a:ext cx="9704438" cy="2585323"/>
+          </a:xfrm>
+          <a:prstGeom prst="rect">
+            <a:avLst/>
+          </a:prstGeom>
+          <a:noFill/>
+        </p:spPr>
+        <p:txBody>
+          <a:bodyPr wrap="square" rtlCol="0">
+            <a:spAutoFit/>
+          </a:bodyPr>
+          <a:lstStyle/>
+          <a:p>
+            <a:r>
+              <a:rPr lang="en-US" dirty="0"/>
+              <a:t>Create new folder as name blogs =&gt;  blogs/2020/1/23 or blogs/a/b/c</a:t>
+            </a:r>
+          </a:p>
+          <a:p>
+            <a:endParaRPr lang="en-US" dirty="0"/>
+          </a:p>
+          <a:p>
+            <a:r>
+              <a:rPr lang="en-US" dirty="0"/>
+              <a:t>Blog : if we want blog between  year 2000 – 2020 and  in any year 10 blogs so 2000 page of blogs  =&gt; handle this =&gt; create year folder =&gt; [dayId.js] =&gt; 1*10 </a:t>
+            </a:r>
+          </a:p>
+          <a:p>
+            <a:r>
+              <a:rPr lang="en-US" dirty="0"/>
+              <a:t>If we want new as month or any thing so we must create [</a:t>
+            </a:r>
+            <a:r>
+              <a:rPr lang="en-US" dirty="0" err="1"/>
+              <a:t>dayId</a:t>
+            </a:r>
+            <a:r>
+              <a:rPr lang="en-US" dirty="0"/>
+              <a:t>] folder and</a:t>
+            </a:r>
+            <a:r>
+              <a:rPr lang="fa-IR" dirty="0"/>
+              <a:t> </a:t>
+            </a:r>
+            <a:r>
+              <a:rPr lang="en-US" dirty="0"/>
+              <a:t>suppose many of this sorted or any thing we must create 1000 folder and this is not working and not good .</a:t>
+            </a:r>
+          </a:p>
+          <a:p>
+            <a:endParaRPr lang="en-US" dirty="0"/>
+          </a:p>
+          <a:p>
+            <a:r>
+              <a:rPr lang="en-US" dirty="0"/>
+              <a:t>So : for fix this in next  =&gt; [</a:t>
+            </a:r>
+            <a:r>
+              <a:rPr lang="en-US" dirty="0" err="1"/>
+              <a:t>dayId</a:t>
+            </a:r>
+            <a:r>
+              <a:rPr lang="en-US" dirty="0"/>
+              <a:t>] * [year]  =&gt; [a] * [b] * [c] = 1 this is catch all routes</a:t>
+            </a:r>
+          </a:p>
+          <a:p>
+            <a:r>
+              <a:rPr lang="en-US" dirty="0"/>
+              <a:t>For better performance  in blogs folder create […params].js</a:t>
+            </a:r>
+          </a:p>
+        </p:txBody>
+      </p:sp>
+      <p:sp>
+        <p:nvSpPr>
+          <p:cNvPr id="4" name="Rectangle 3">
+            <a:extLst>
+              <a:ext uri="{FF2B5EF4-FFF2-40B4-BE49-F238E27FC236}">
+                <a16:creationId xmlns:a16="http://schemas.microsoft.com/office/drawing/2014/main" id="{FEBD81BF-2641-7F50-E9F8-87CAF80A4B8B}"/>
+              </a:ext>
+            </a:extLst>
+          </p:cNvPr>
+          <p:cNvSpPr/>
+          <p:nvPr/>
+        </p:nvSpPr>
+        <p:spPr>
+          <a:xfrm>
+            <a:off x="680321" y="5161935"/>
+            <a:ext cx="9613861" cy="1489588"/>
+          </a:xfrm>
+          <a:prstGeom prst="rect">
+            <a:avLst/>
+          </a:prstGeom>
+          <a:solidFill>
+            <a:schemeClr val="tx2">
+              <a:lumMod val="10000"/>
+            </a:schemeClr>
+          </a:solidFill>
+          <a:ln>
+            <a:solidFill>
+              <a:schemeClr val="tx2">
+                <a:lumMod val="10000"/>
+              </a:schemeClr>
+            </a:solidFill>
+          </a:ln>
+        </p:spPr>
+        <p:style>
+          <a:lnRef idx="2">
+            <a:schemeClr val="accent1">
+              <a:shade val="50000"/>
+            </a:schemeClr>
+          </a:lnRef>
+          <a:fillRef idx="1">
+            <a:schemeClr val="accent1"/>
+          </a:fillRef>
+          <a:effectRef idx="0">
+            <a:schemeClr val="accent1"/>
+          </a:effectRef>
+          <a:fontRef idx="minor">
+            <a:schemeClr val="lt1"/>
+          </a:fontRef>
+        </p:style>
+        <p:txBody>
+          <a:bodyPr rtlCol="0" anchor="ctr"/>
+          <a:lstStyle/>
+          <a:p>
+            <a:pPr algn="ctr"/>
+            <a:endParaRPr lang="en-US" dirty="0"/>
+          </a:p>
+        </p:txBody>
+      </p:sp>
+      <p:sp>
+        <p:nvSpPr>
+          <p:cNvPr id="6" name="TextBox 5">
+            <a:extLst>
+              <a:ext uri="{FF2B5EF4-FFF2-40B4-BE49-F238E27FC236}">
+                <a16:creationId xmlns:a16="http://schemas.microsoft.com/office/drawing/2014/main" id="{523F7E60-D6E9-5CF6-8264-55F635B4A20D}"/>
+              </a:ext>
+            </a:extLst>
+          </p:cNvPr>
+          <p:cNvSpPr txBox="1"/>
+          <p:nvPr/>
+        </p:nvSpPr>
+        <p:spPr>
+          <a:xfrm>
+            <a:off x="847725" y="5161935"/>
+            <a:ext cx="7543800" cy="1384995"/>
+          </a:xfrm>
+          <a:prstGeom prst="rect">
+            <a:avLst/>
+          </a:prstGeom>
+          <a:noFill/>
+        </p:spPr>
+        <p:txBody>
+          <a:bodyPr wrap="square" rtlCol="0">
+            <a:spAutoFit/>
+          </a:bodyPr>
+          <a:lstStyle/>
+          <a:p>
+            <a:pPr marL="0" marR="0" lvl="0" indent="0" algn="l" defTabSz="457200" rtl="0" eaLnBrk="1" fontAlgn="auto" latinLnBrk="0" hangingPunct="1">
+              <a:lnSpc>
+                <a:spcPct val="100000"/>
+              </a:lnSpc>
+              <a:spcBef>
+                <a:spcPts val="0"/>
+              </a:spcBef>
+              <a:spcAft>
+                <a:spcPts val="0"/>
+              </a:spcAft>
+              <a:buClrTx/>
+              <a:buSzTx/>
+              <a:buFontTx/>
+              <a:buNone/>
+              <a:tabLst/>
+              <a:defRPr/>
+            </a:pPr>
+            <a:r>
+              <a:rPr kumimoji="0" lang="en-US" sz="1200" b="0" i="0" u="none" strike="noStrike" kern="1200" cap="none" spc="0" normalizeH="0" baseline="0" noProof="0" dirty="0">
+                <a:ln>
+                  <a:noFill/>
+                </a:ln>
+                <a:solidFill>
+                  <a:srgbClr val="0070C0"/>
+                </a:solidFill>
+                <a:effectLst/>
+                <a:uLnTx/>
+                <a:uFillTx/>
+                <a:latin typeface="Trebuchet MS" panose="020B0603020202020204"/>
+                <a:ea typeface="+mn-ea"/>
+                <a:cs typeface="+mn-cs"/>
+              </a:rPr>
+              <a:t>Import {</a:t>
+            </a:r>
+            <a:r>
+              <a:rPr kumimoji="0" lang="en-US" sz="1200" b="0" i="0" u="none" strike="noStrike" kern="1200" cap="none" spc="0" normalizeH="0" baseline="0" noProof="0" dirty="0" err="1">
+                <a:ln>
+                  <a:noFill/>
+                </a:ln>
+                <a:solidFill>
+                  <a:srgbClr val="0070C0"/>
+                </a:solidFill>
+                <a:effectLst/>
+                <a:uLnTx/>
+                <a:uFillTx/>
+                <a:latin typeface="Trebuchet MS" panose="020B0603020202020204"/>
+                <a:ea typeface="+mn-ea"/>
+                <a:cs typeface="+mn-cs"/>
+              </a:rPr>
+              <a:t>useRouter</a:t>
+            </a:r>
+            <a:r>
+              <a:rPr kumimoji="0" lang="en-US" sz="1200" b="0" i="0" u="none" strike="noStrike" kern="1200" cap="none" spc="0" normalizeH="0" baseline="0" noProof="0" dirty="0">
+                <a:ln>
+                  <a:noFill/>
+                </a:ln>
+                <a:solidFill>
+                  <a:srgbClr val="0070C0"/>
+                </a:solidFill>
+                <a:effectLst/>
+                <a:uLnTx/>
+                <a:uFillTx/>
+                <a:latin typeface="Trebuchet MS" panose="020B0603020202020204"/>
+                <a:ea typeface="+mn-ea"/>
+                <a:cs typeface="+mn-cs"/>
+              </a:rPr>
+              <a:t>} from “next/router”;</a:t>
+            </a:r>
+          </a:p>
+          <a:p>
+            <a:pPr marL="0" marR="0" lvl="0" indent="0" algn="l" defTabSz="457200" rtl="0" eaLnBrk="1" fontAlgn="auto" latinLnBrk="0" hangingPunct="1">
+              <a:lnSpc>
+                <a:spcPct val="100000"/>
+              </a:lnSpc>
+              <a:spcBef>
+                <a:spcPts val="0"/>
+              </a:spcBef>
+              <a:spcAft>
+                <a:spcPts val="0"/>
+              </a:spcAft>
+              <a:buClrTx/>
+              <a:buSzTx/>
+              <a:buFontTx/>
+              <a:buNone/>
+              <a:tabLst/>
+              <a:defRPr/>
+            </a:pPr>
+            <a:r>
+              <a:rPr kumimoji="0" lang="en-US" sz="1200" b="0" i="0" u="none" strike="noStrike" kern="1200" cap="none" spc="0" normalizeH="0" baseline="0" noProof="0" dirty="0">
+                <a:ln>
+                  <a:noFill/>
+                </a:ln>
+                <a:solidFill>
+                  <a:srgbClr val="92D050"/>
+                </a:solidFill>
+                <a:effectLst/>
+                <a:uLnTx/>
+                <a:uFillTx/>
+                <a:latin typeface="Trebuchet MS" panose="020B0603020202020204"/>
+                <a:ea typeface="+mn-ea"/>
+                <a:cs typeface="+mn-cs"/>
+              </a:rPr>
+              <a:t>// blogs/2020/10/24</a:t>
+            </a:r>
+          </a:p>
+          <a:p>
+            <a:pPr marL="0" marR="0" lvl="0" indent="0" algn="l" defTabSz="457200" rtl="0" eaLnBrk="1" fontAlgn="auto" latinLnBrk="0" hangingPunct="1">
+              <a:lnSpc>
+                <a:spcPct val="100000"/>
+              </a:lnSpc>
+              <a:spcBef>
+                <a:spcPts val="0"/>
+              </a:spcBef>
+              <a:spcAft>
+                <a:spcPts val="0"/>
+              </a:spcAft>
+              <a:buClrTx/>
+              <a:buSzTx/>
+              <a:buFontTx/>
+              <a:buNone/>
+              <a:tabLst/>
+              <a:defRPr/>
+            </a:pPr>
+            <a:r>
+              <a:rPr kumimoji="0" lang="en-US" sz="1200" b="0" i="0" u="none" strike="noStrike" kern="1200" cap="none" spc="0" normalizeH="0" baseline="0" noProof="0" dirty="0">
+                <a:ln>
+                  <a:noFill/>
+                </a:ln>
+                <a:solidFill>
+                  <a:srgbClr val="0070C0"/>
+                </a:solidFill>
+                <a:effectLst/>
+                <a:uLnTx/>
+                <a:uFillTx/>
+                <a:latin typeface="Trebuchet MS" panose="020B0603020202020204"/>
+                <a:ea typeface="+mn-ea"/>
+                <a:cs typeface="+mn-cs"/>
+              </a:rPr>
+              <a:t>const Blog () =&gt; {</a:t>
+            </a:r>
+          </a:p>
+          <a:p>
+            <a:pPr marL="0" marR="0" lvl="0" indent="0" algn="l" defTabSz="457200" rtl="0" eaLnBrk="1" fontAlgn="auto" latinLnBrk="0" hangingPunct="1">
+              <a:lnSpc>
+                <a:spcPct val="100000"/>
+              </a:lnSpc>
+              <a:spcBef>
+                <a:spcPts val="0"/>
+              </a:spcBef>
+              <a:spcAft>
+                <a:spcPts val="0"/>
+              </a:spcAft>
+              <a:buClrTx/>
+              <a:buSzTx/>
+              <a:buFontTx/>
+              <a:buNone/>
+              <a:tabLst/>
+              <a:defRPr/>
+            </a:pPr>
+            <a:r>
+              <a:rPr kumimoji="0" lang="en-US" sz="1200" b="0" i="0" u="none" strike="noStrike" kern="1200" cap="none" spc="0" normalizeH="0" baseline="0" noProof="0" dirty="0">
+                <a:ln>
+                  <a:noFill/>
+                </a:ln>
+                <a:solidFill>
+                  <a:srgbClr val="0070C0"/>
+                </a:solidFill>
+                <a:effectLst/>
+                <a:uLnTx/>
+                <a:uFillTx/>
+                <a:latin typeface="Trebuchet MS" panose="020B0603020202020204"/>
+                <a:ea typeface="+mn-ea"/>
+                <a:cs typeface="+mn-cs"/>
+              </a:rPr>
+              <a:t>	const router = </a:t>
+            </a:r>
+            <a:r>
+              <a:rPr kumimoji="0" lang="en-US" sz="1200" b="0" i="0" u="none" strike="noStrike" kern="1200" cap="none" spc="0" normalizeH="0" baseline="0" noProof="0" dirty="0" err="1">
+                <a:ln>
+                  <a:noFill/>
+                </a:ln>
+                <a:solidFill>
+                  <a:srgbClr val="0070C0"/>
+                </a:solidFill>
+                <a:effectLst/>
+                <a:uLnTx/>
+                <a:uFillTx/>
+                <a:latin typeface="Trebuchet MS" panose="020B0603020202020204"/>
+                <a:ea typeface="+mn-ea"/>
+                <a:cs typeface="+mn-cs"/>
+              </a:rPr>
+              <a:t>useRouter</a:t>
+            </a:r>
+            <a:r>
+              <a:rPr kumimoji="0" lang="en-US" sz="1200" b="0" i="0" u="none" strike="noStrike" kern="1200" cap="none" spc="0" normalizeH="0" baseline="0" noProof="0" dirty="0">
+                <a:ln>
+                  <a:noFill/>
+                </a:ln>
+                <a:solidFill>
+                  <a:srgbClr val="0070C0"/>
+                </a:solidFill>
+                <a:effectLst/>
+                <a:uLnTx/>
+                <a:uFillTx/>
+                <a:latin typeface="Trebuchet MS" panose="020B0603020202020204"/>
+                <a:ea typeface="+mn-ea"/>
+                <a:cs typeface="+mn-cs"/>
+              </a:rPr>
+              <a:t>();</a:t>
+            </a:r>
+          </a:p>
+          <a:p>
+            <a:pPr marL="0" marR="0" lvl="0" indent="0" algn="l" defTabSz="457200" rtl="0" eaLnBrk="1" fontAlgn="auto" latinLnBrk="0" hangingPunct="1">
+              <a:lnSpc>
+                <a:spcPct val="100000"/>
+              </a:lnSpc>
+              <a:spcBef>
+                <a:spcPts val="0"/>
+              </a:spcBef>
+              <a:spcAft>
+                <a:spcPts val="0"/>
+              </a:spcAft>
+              <a:buClrTx/>
+              <a:buSzTx/>
+              <a:buFontTx/>
+              <a:buNone/>
+              <a:tabLst/>
+              <a:defRPr/>
+            </a:pPr>
+            <a:r>
+              <a:rPr kumimoji="0" lang="en-US" sz="1200" b="0" i="0" u="none" strike="noStrike" kern="1200" cap="none" spc="0" normalizeH="0" baseline="0" noProof="0" dirty="0">
+                <a:ln>
+                  <a:noFill/>
+                </a:ln>
+                <a:solidFill>
+                  <a:srgbClr val="0070C0"/>
+                </a:solidFill>
+                <a:effectLst/>
+                <a:uLnTx/>
+                <a:uFillTx/>
+                <a:latin typeface="Trebuchet MS" panose="020B0603020202020204"/>
+                <a:ea typeface="+mn-ea"/>
+                <a:cs typeface="+mn-cs"/>
+              </a:rPr>
+              <a:t>	console.log(</a:t>
+            </a:r>
+            <a:r>
+              <a:rPr kumimoji="0" lang="en-US" sz="1200" b="0" i="0" u="none" strike="noStrike" kern="1200" cap="none" spc="0" normalizeH="0" baseline="0" noProof="0" dirty="0" err="1">
+                <a:ln>
+                  <a:noFill/>
+                </a:ln>
+                <a:solidFill>
+                  <a:srgbClr val="0070C0"/>
+                </a:solidFill>
+                <a:effectLst/>
+                <a:uLnTx/>
+                <a:uFillTx/>
+                <a:latin typeface="Trebuchet MS" panose="020B0603020202020204"/>
+                <a:ea typeface="+mn-ea"/>
+                <a:cs typeface="+mn-cs"/>
+              </a:rPr>
+              <a:t>router.query</a:t>
+            </a:r>
+            <a:r>
+              <a:rPr kumimoji="0" lang="en-US" sz="1200" b="0" i="0" u="none" strike="noStrike" kern="1200" cap="none" spc="0" normalizeH="0" baseline="0" noProof="0" dirty="0">
+                <a:ln>
+                  <a:noFill/>
+                </a:ln>
+                <a:solidFill>
+                  <a:srgbClr val="0070C0"/>
+                </a:solidFill>
+                <a:effectLst/>
+                <a:uLnTx/>
+                <a:uFillTx/>
+                <a:latin typeface="Trebuchet MS" panose="020B0603020202020204"/>
+                <a:ea typeface="+mn-ea"/>
+                <a:cs typeface="+mn-cs"/>
+              </a:rPr>
+              <a:t>) </a:t>
+            </a:r>
+            <a:r>
+              <a:rPr kumimoji="0" lang="en-US" sz="1200" b="0" i="0" u="none" strike="noStrike" kern="1200" cap="none" spc="0" normalizeH="0" baseline="0" noProof="0" dirty="0">
+                <a:ln>
+                  <a:noFill/>
+                </a:ln>
+                <a:solidFill>
+                  <a:srgbClr val="92D050"/>
+                </a:solidFill>
+                <a:effectLst/>
+                <a:uLnTx/>
+                <a:uFillTx/>
+                <a:latin typeface="Trebuchet MS" panose="020B0603020202020204"/>
+                <a:ea typeface="+mn-ea"/>
+                <a:cs typeface="+mn-cs"/>
+              </a:rPr>
+              <a:t>// out =&gt; is array [2020 , 10  , 24] and we easiest send to backend</a:t>
+            </a:r>
+          </a:p>
+          <a:p>
+            <a:pPr marL="0" marR="0" lvl="0" indent="0" algn="l" defTabSz="457200" rtl="0" eaLnBrk="1" fontAlgn="auto" latinLnBrk="0" hangingPunct="1">
+              <a:lnSpc>
+                <a:spcPct val="100000"/>
+              </a:lnSpc>
+              <a:spcBef>
+                <a:spcPts val="0"/>
+              </a:spcBef>
+              <a:spcAft>
+                <a:spcPts val="0"/>
+              </a:spcAft>
+              <a:buClrTx/>
+              <a:buSzTx/>
+              <a:buFontTx/>
+              <a:buNone/>
+              <a:tabLst/>
+              <a:defRPr/>
+            </a:pPr>
+            <a:r>
+              <a:rPr kumimoji="0" lang="en-US" sz="1200" b="0" i="0" u="none" strike="noStrike" kern="1200" cap="none" spc="0" normalizeH="0" baseline="0" noProof="0" dirty="0">
+                <a:ln>
+                  <a:noFill/>
+                </a:ln>
+                <a:solidFill>
+                  <a:srgbClr val="0070C0"/>
+                </a:solidFill>
+                <a:effectLst/>
+                <a:uLnTx/>
+                <a:uFillTx/>
+                <a:latin typeface="Trebuchet MS" panose="020B0603020202020204"/>
+                <a:ea typeface="+mn-ea"/>
+                <a:cs typeface="+mn-cs"/>
+              </a:rPr>
+              <a:t>	return &lt;h1&gt;catch all routes&lt;/h1&gt;}</a:t>
+            </a:r>
+          </a:p>
+          <a:p>
+            <a:pPr marL="0" marR="0" lvl="0" indent="0" algn="l" defTabSz="457200" rtl="0" eaLnBrk="1" fontAlgn="auto" latinLnBrk="0" hangingPunct="1">
+              <a:lnSpc>
+                <a:spcPct val="100000"/>
+              </a:lnSpc>
+              <a:spcBef>
+                <a:spcPts val="0"/>
+              </a:spcBef>
+              <a:spcAft>
+                <a:spcPts val="0"/>
+              </a:spcAft>
+              <a:buClrTx/>
+              <a:buSzTx/>
+              <a:buFontTx/>
+              <a:buNone/>
+              <a:tabLst/>
+              <a:defRPr/>
+            </a:pPr>
+            <a:r>
+              <a:rPr kumimoji="0" lang="en-US" sz="1200" b="0" i="0" u="none" strike="noStrike" kern="1200" cap="none" spc="0" normalizeH="0" baseline="0" noProof="0" dirty="0">
+                <a:ln>
+                  <a:noFill/>
+                </a:ln>
+                <a:solidFill>
+                  <a:srgbClr val="0070C0"/>
+                </a:solidFill>
+                <a:effectLst/>
+                <a:uLnTx/>
+                <a:uFillTx/>
+                <a:latin typeface="Trebuchet MS" panose="020B0603020202020204"/>
+                <a:ea typeface="+mn-ea"/>
+                <a:cs typeface="+mn-cs"/>
+              </a:rPr>
+              <a:t>Export default Blog;</a:t>
+            </a:r>
+          </a:p>
+        </p:txBody>
+      </p:sp>
+    </p:spTree>
+    <p:extLst>
+      <p:ext uri="{BB962C8B-B14F-4D97-AF65-F5344CB8AC3E}">
+        <p14:creationId xmlns:p14="http://schemas.microsoft.com/office/powerpoint/2010/main" val="1052083884"/>
       </p:ext>
     </p:extLst>
   </p:cSld>

</xml_diff>

<commit_message>
SEO in js app
</commit_message>
<xml_diff>
--- a/NEXT.pptx
+++ b/NEXT.pptx
@@ -5,7 +5,7 @@
     <p:sldMasterId id="2147483690" r:id="rId1"/>
   </p:sldMasterIdLst>
   <p:notesMasterIdLst>
-    <p:notesMasterId r:id="rId12"/>
+    <p:notesMasterId r:id="rId18"/>
   </p:notesMasterIdLst>
   <p:sldIdLst>
     <p:sldId id="256" r:id="rId2"/>
@@ -18,6 +18,12 @@
     <p:sldId id="264" r:id="rId9"/>
     <p:sldId id="265" r:id="rId10"/>
     <p:sldId id="266" r:id="rId11"/>
+    <p:sldId id="267" r:id="rId12"/>
+    <p:sldId id="268" r:id="rId13"/>
+    <p:sldId id="269" r:id="rId14"/>
+    <p:sldId id="270" r:id="rId15"/>
+    <p:sldId id="271" r:id="rId16"/>
+    <p:sldId id="272" r:id="rId17"/>
   </p:sldIdLst>
   <p:sldSz cx="12192000" cy="6858000"/>
   <p:notesSz cx="6858000" cy="9144000"/>
@@ -206,7 +212,7 @@
           <a:p>
             <a:fld id="{9763D4A8-E6B7-4733-A8D3-B38587EC5662}" type="datetimeFigureOut">
               <a:rPr lang="en-US" smtClean="0"/>
-              <a:t>12/24/2022</a:t>
+              <a:t>12/25/2022</a:t>
             </a:fld>
             <a:endParaRPr lang="en-US"/>
           </a:p>
@@ -747,7 +753,7 @@
           <a:p>
             <a:fld id="{1222F12B-E24C-4FA9-96CE-E3C4C7F08EF2}" type="datetimeFigureOut">
               <a:rPr lang="en-US" smtClean="0"/>
-              <a:t>12/24/2022</a:t>
+              <a:t>12/25/2022</a:t>
             </a:fld>
             <a:endParaRPr lang="en-US"/>
           </a:p>
@@ -1161,7 +1167,7 @@
           <a:p>
             <a:fld id="{1222F12B-E24C-4FA9-96CE-E3C4C7F08EF2}" type="datetimeFigureOut">
               <a:rPr lang="en-US" smtClean="0"/>
-              <a:t>12/24/2022</a:t>
+              <a:t>12/25/2022</a:t>
             </a:fld>
             <a:endParaRPr lang="en-US"/>
           </a:p>
@@ -1497,7 +1503,7 @@
           <a:p>
             <a:fld id="{1222F12B-E24C-4FA9-96CE-E3C4C7F08EF2}" type="datetimeFigureOut">
               <a:rPr lang="en-US" smtClean="0"/>
-              <a:t>12/24/2022</a:t>
+              <a:t>12/25/2022</a:t>
             </a:fld>
             <a:endParaRPr lang="en-US"/>
           </a:p>
@@ -1902,7 +1908,7 @@
           <a:p>
             <a:fld id="{1222F12B-E24C-4FA9-96CE-E3C4C7F08EF2}" type="datetimeFigureOut">
               <a:rPr lang="en-US" smtClean="0"/>
-              <a:t>12/24/2022</a:t>
+              <a:t>12/25/2022</a:t>
             </a:fld>
             <a:endParaRPr lang="en-US"/>
           </a:p>
@@ -2470,7 +2476,7 @@
           <a:p>
             <a:fld id="{1222F12B-E24C-4FA9-96CE-E3C4C7F08EF2}" type="datetimeFigureOut">
               <a:rPr lang="en-US" smtClean="0"/>
-              <a:t>12/24/2022</a:t>
+              <a:t>12/25/2022</a:t>
             </a:fld>
             <a:endParaRPr lang="en-US"/>
           </a:p>
@@ -3151,7 +3157,7 @@
           <a:p>
             <a:fld id="{1222F12B-E24C-4FA9-96CE-E3C4C7F08EF2}" type="datetimeFigureOut">
               <a:rPr lang="en-US" smtClean="0"/>
-              <a:t>12/24/2022</a:t>
+              <a:t>12/25/2022</a:t>
             </a:fld>
             <a:endParaRPr lang="en-US"/>
           </a:p>
@@ -4064,7 +4070,7 @@
           <a:p>
             <a:fld id="{1222F12B-E24C-4FA9-96CE-E3C4C7F08EF2}" type="datetimeFigureOut">
               <a:rPr lang="en-US" smtClean="0"/>
-              <a:t>12/24/2022</a:t>
+              <a:t>12/25/2022</a:t>
             </a:fld>
             <a:endParaRPr lang="en-US"/>
           </a:p>
@@ -4377,7 +4383,7 @@
           <a:p>
             <a:fld id="{1222F12B-E24C-4FA9-96CE-E3C4C7F08EF2}" type="datetimeFigureOut">
               <a:rPr lang="en-US" smtClean="0"/>
-              <a:t>12/24/2022</a:t>
+              <a:t>12/25/2022</a:t>
             </a:fld>
             <a:endParaRPr lang="en-US"/>
           </a:p>
@@ -4641,7 +4647,7 @@
           <a:p>
             <a:fld id="{1222F12B-E24C-4FA9-96CE-E3C4C7F08EF2}" type="datetimeFigureOut">
               <a:rPr lang="en-US" smtClean="0"/>
-              <a:t>12/24/2022</a:t>
+              <a:t>12/25/2022</a:t>
             </a:fld>
             <a:endParaRPr lang="en-US"/>
           </a:p>
@@ -4964,7 +4970,7 @@
           <a:p>
             <a:fld id="{1222F12B-E24C-4FA9-96CE-E3C4C7F08EF2}" type="datetimeFigureOut">
               <a:rPr lang="en-US" smtClean="0"/>
-              <a:t>12/24/2022</a:t>
+              <a:t>12/25/2022</a:t>
             </a:fld>
             <a:endParaRPr lang="en-US"/>
           </a:p>
@@ -5353,7 +5359,7 @@
           <a:p>
             <a:fld id="{1222F12B-E24C-4FA9-96CE-E3C4C7F08EF2}" type="datetimeFigureOut">
               <a:rPr lang="en-US" smtClean="0"/>
-              <a:t>12/24/2022</a:t>
+              <a:t>12/25/2022</a:t>
             </a:fld>
             <a:endParaRPr lang="en-US"/>
           </a:p>
@@ -5729,7 +5735,7 @@
           <a:p>
             <a:fld id="{1222F12B-E24C-4FA9-96CE-E3C4C7F08EF2}" type="datetimeFigureOut">
               <a:rPr lang="en-US" smtClean="0"/>
-              <a:t>12/24/2022</a:t>
+              <a:t>12/25/2022</a:t>
             </a:fld>
             <a:endParaRPr lang="en-US"/>
           </a:p>
@@ -6235,7 +6241,7 @@
           <a:p>
             <a:fld id="{1222F12B-E24C-4FA9-96CE-E3C4C7F08EF2}" type="datetimeFigureOut">
               <a:rPr lang="en-US" smtClean="0"/>
-              <a:t>12/24/2022</a:t>
+              <a:t>12/25/2022</a:t>
             </a:fld>
             <a:endParaRPr lang="en-US"/>
           </a:p>
@@ -6492,7 +6498,7 @@
           <a:p>
             <a:fld id="{1222F12B-E24C-4FA9-96CE-E3C4C7F08EF2}" type="datetimeFigureOut">
               <a:rPr lang="en-US" smtClean="0"/>
-              <a:t>12/24/2022</a:t>
+              <a:t>12/25/2022</a:t>
             </a:fld>
             <a:endParaRPr lang="en-US"/>
           </a:p>
@@ -6655,7 +6661,7 @@
           <a:p>
             <a:fld id="{1222F12B-E24C-4FA9-96CE-E3C4C7F08EF2}" type="datetimeFigureOut">
               <a:rPr lang="en-US" smtClean="0"/>
-              <a:t>12/24/2022</a:t>
+              <a:t>12/25/2022</a:t>
             </a:fld>
             <a:endParaRPr lang="en-US"/>
           </a:p>
@@ -7045,7 +7051,7 @@
           <a:p>
             <a:fld id="{1222F12B-E24C-4FA9-96CE-E3C4C7F08EF2}" type="datetimeFigureOut">
               <a:rPr lang="en-US" smtClean="0"/>
-              <a:t>12/24/2022</a:t>
+              <a:t>12/25/2022</a:t>
             </a:fld>
             <a:endParaRPr lang="en-US"/>
           </a:p>
@@ -7454,7 +7460,7 @@
           <a:p>
             <a:fld id="{1222F12B-E24C-4FA9-96CE-E3C4C7F08EF2}" type="datetimeFigureOut">
               <a:rPr lang="en-US" smtClean="0"/>
-              <a:t>12/24/2022</a:t>
+              <a:t>12/25/2022</a:t>
             </a:fld>
             <a:endParaRPr lang="en-US"/>
           </a:p>
@@ -7698,7 +7704,7 @@
           <a:p>
             <a:fld id="{1222F12B-E24C-4FA9-96CE-E3C4C7F08EF2}" type="datetimeFigureOut">
               <a:rPr lang="en-US" smtClean="0"/>
-              <a:t>12/24/2022</a:t>
+              <a:t>12/25/2022</a:t>
             </a:fld>
             <a:endParaRPr lang="en-US"/>
           </a:p>
@@ -8264,6 +8270,2324 @@
   <p:clrMapOvr>
     <a:masterClrMapping/>
   </p:clrMapOvr>
+  <p:timing>
+    <p:tnLst>
+      <p:par>
+        <p:cTn id="1" dur="indefinite" restart="never" nodeType="tmRoot">
+          <p:childTnLst>
+            <p:seq concurrent="1" nextAc="seek">
+              <p:cTn id="2" dur="indefinite" nodeType="mainSeq">
+                <p:childTnLst>
+                  <p:par>
+                    <p:cTn id="3" fill="hold">
+                      <p:stCondLst>
+                        <p:cond delay="indefinite"/>
+                      </p:stCondLst>
+                      <p:childTnLst>
+                        <p:par>
+                          <p:cTn id="4" fill="hold">
+                            <p:stCondLst>
+                              <p:cond delay="0"/>
+                            </p:stCondLst>
+                            <p:childTnLst>
+                              <p:par>
+                                <p:cTn id="5" presetID="10" presetClass="entr" presetSubtype="0" fill="hold" grpId="0" nodeType="clickEffect">
+                                  <p:stCondLst>
+                                    <p:cond delay="0"/>
+                                  </p:stCondLst>
+                                  <p:childTnLst>
+                                    <p:set>
+                                      <p:cBhvr>
+                                        <p:cTn id="6" dur="1" fill="hold">
+                                          <p:stCondLst>
+                                            <p:cond delay="0"/>
+                                          </p:stCondLst>
+                                        </p:cTn>
+                                        <p:tgtEl>
+                                          <p:spTgt spid="2"/>
+                                        </p:tgtEl>
+                                        <p:attrNameLst>
+                                          <p:attrName>style.visibility</p:attrName>
+                                        </p:attrNameLst>
+                                      </p:cBhvr>
+                                      <p:to>
+                                        <p:strVal val="visible"/>
+                                      </p:to>
+                                    </p:set>
+                                    <p:animEffect transition="in" filter="fade">
+                                      <p:cBhvr>
+                                        <p:cTn id="7" dur="500"/>
+                                        <p:tgtEl>
+                                          <p:spTgt spid="2"/>
+                                        </p:tgtEl>
+                                      </p:cBhvr>
+                                    </p:animEffect>
+                                  </p:childTnLst>
+                                </p:cTn>
+                              </p:par>
+                            </p:childTnLst>
+                          </p:cTn>
+                        </p:par>
+                      </p:childTnLst>
+                    </p:cTn>
+                  </p:par>
+                </p:childTnLst>
+              </p:cTn>
+              <p:prevCondLst>
+                <p:cond evt="onPrev" delay="0">
+                  <p:tgtEl>
+                    <p:sldTgt/>
+                  </p:tgtEl>
+                </p:cond>
+              </p:prevCondLst>
+              <p:nextCondLst>
+                <p:cond evt="onNext" delay="0">
+                  <p:tgtEl>
+                    <p:sldTgt/>
+                  </p:tgtEl>
+                </p:cond>
+              </p:nextCondLst>
+            </p:seq>
+          </p:childTnLst>
+        </p:cTn>
+      </p:par>
+    </p:tnLst>
+    <p:bldLst>
+      <p:bldP spid="2" grpId="0"/>
+    </p:bldLst>
+  </p:timing>
+</p:sld>
+</file>
+
+<file path=ppt/slides/slide11.xml><?xml version="1.0" encoding="utf-8"?>
+<p:sld xmlns:a="http://schemas.openxmlformats.org/drawingml/2006/main" xmlns:r="http://schemas.openxmlformats.org/officeDocument/2006/relationships" xmlns:p="http://schemas.openxmlformats.org/presentationml/2006/main">
+  <p:cSld>
+    <p:spTree>
+      <p:nvGrpSpPr>
+        <p:cNvPr id="1" name=""/>
+        <p:cNvGrpSpPr/>
+        <p:nvPr/>
+      </p:nvGrpSpPr>
+      <p:grpSpPr>
+        <a:xfrm>
+          <a:off x="0" y="0"/>
+          <a:ext cx="0" cy="0"/>
+          <a:chOff x="0" y="0"/>
+          <a:chExt cx="0" cy="0"/>
+        </a:xfrm>
+      </p:grpSpPr>
+      <p:sp>
+        <p:nvSpPr>
+          <p:cNvPr id="2" name="Title 1">
+            <a:extLst>
+              <a:ext uri="{FF2B5EF4-FFF2-40B4-BE49-F238E27FC236}">
+                <a16:creationId xmlns:a16="http://schemas.microsoft.com/office/drawing/2014/main" id="{942E7E4A-FAE9-9B03-F70F-AA29DEA3EC55}"/>
+              </a:ext>
+            </a:extLst>
+          </p:cNvPr>
+          <p:cNvSpPr>
+            <a:spLocks noGrp="1"/>
+          </p:cNvSpPr>
+          <p:nvPr>
+            <p:ph type="title"/>
+          </p:nvPr>
+        </p:nvSpPr>
+        <p:spPr/>
+        <p:txBody>
+          <a:bodyPr/>
+          <a:lstStyle/>
+          <a:p>
+            <a:r>
+              <a:rPr lang="en-US" dirty="0"/>
+              <a:t>Link components</a:t>
+            </a:r>
+          </a:p>
+        </p:txBody>
+      </p:sp>
+      <p:sp>
+        <p:nvSpPr>
+          <p:cNvPr id="3" name="TextBox 2">
+            <a:extLst>
+              <a:ext uri="{FF2B5EF4-FFF2-40B4-BE49-F238E27FC236}">
+                <a16:creationId xmlns:a16="http://schemas.microsoft.com/office/drawing/2014/main" id="{FF7D158D-1AEE-7AAC-B3AC-BB03B51DF0E2}"/>
+              </a:ext>
+            </a:extLst>
+          </p:cNvPr>
+          <p:cNvSpPr txBox="1"/>
+          <p:nvPr/>
+        </p:nvSpPr>
+        <p:spPr>
+          <a:xfrm>
+            <a:off x="745724" y="2405849"/>
+            <a:ext cx="9548458" cy="923330"/>
+          </a:xfrm>
+          <a:prstGeom prst="rect">
+            <a:avLst/>
+          </a:prstGeom>
+          <a:noFill/>
+        </p:spPr>
+        <p:txBody>
+          <a:bodyPr wrap="square" rtlCol="0">
+            <a:spAutoFit/>
+          </a:bodyPr>
+          <a:lstStyle/>
+          <a:p>
+            <a:r>
+              <a:rPr lang="en-US" dirty="0"/>
+              <a:t>How to displaced in pages ? In next we use link </a:t>
+            </a:r>
+            <a:r>
+              <a:rPr lang="en-US" dirty="0" err="1"/>
+              <a:t>componetns</a:t>
+            </a:r>
+            <a:r>
+              <a:rPr lang="en-US" dirty="0"/>
+              <a:t> as work same like &lt;a&gt; tag </a:t>
+            </a:r>
+          </a:p>
+          <a:p>
+            <a:endParaRPr lang="en-US" dirty="0"/>
+          </a:p>
+          <a:p>
+            <a:endParaRPr lang="en-US" dirty="0"/>
+          </a:p>
+        </p:txBody>
+      </p:sp>
+      <p:sp>
+        <p:nvSpPr>
+          <p:cNvPr id="4" name="Rectangle 3">
+            <a:extLst>
+              <a:ext uri="{FF2B5EF4-FFF2-40B4-BE49-F238E27FC236}">
+                <a16:creationId xmlns:a16="http://schemas.microsoft.com/office/drawing/2014/main" id="{489914C1-2B42-ABBB-93B6-8F37A50554E7}"/>
+              </a:ext>
+            </a:extLst>
+          </p:cNvPr>
+          <p:cNvSpPr/>
+          <p:nvPr/>
+        </p:nvSpPr>
+        <p:spPr>
+          <a:xfrm>
+            <a:off x="680321" y="2991775"/>
+            <a:ext cx="9321553" cy="3639843"/>
+          </a:xfrm>
+          <a:prstGeom prst="rect">
+            <a:avLst/>
+          </a:prstGeom>
+          <a:solidFill>
+            <a:schemeClr val="tx2">
+              <a:lumMod val="10000"/>
+            </a:schemeClr>
+          </a:solidFill>
+          <a:ln>
+            <a:solidFill>
+              <a:schemeClr val="tx2">
+                <a:lumMod val="10000"/>
+              </a:schemeClr>
+            </a:solidFill>
+          </a:ln>
+        </p:spPr>
+        <p:style>
+          <a:lnRef idx="2">
+            <a:schemeClr val="accent1">
+              <a:shade val="50000"/>
+            </a:schemeClr>
+          </a:lnRef>
+          <a:fillRef idx="1">
+            <a:schemeClr val="accent1"/>
+          </a:fillRef>
+          <a:effectRef idx="0">
+            <a:schemeClr val="accent1"/>
+          </a:effectRef>
+          <a:fontRef idx="minor">
+            <a:schemeClr val="lt1"/>
+          </a:fontRef>
+        </p:style>
+        <p:txBody>
+          <a:bodyPr rtlCol="0" anchor="ctr"/>
+          <a:lstStyle/>
+          <a:p>
+            <a:pPr algn="ctr"/>
+            <a:endParaRPr lang="en-US" dirty="0"/>
+          </a:p>
+        </p:txBody>
+      </p:sp>
+      <p:sp>
+        <p:nvSpPr>
+          <p:cNvPr id="5" name="TextBox 4">
+            <a:extLst>
+              <a:ext uri="{FF2B5EF4-FFF2-40B4-BE49-F238E27FC236}">
+                <a16:creationId xmlns:a16="http://schemas.microsoft.com/office/drawing/2014/main" id="{6D1B06FD-893E-C816-0771-ECEF232CC2A9}"/>
+              </a:ext>
+            </a:extLst>
+          </p:cNvPr>
+          <p:cNvSpPr txBox="1"/>
+          <p:nvPr/>
+        </p:nvSpPr>
+        <p:spPr>
+          <a:xfrm>
+            <a:off x="1012055" y="3286459"/>
+            <a:ext cx="8096435" cy="3539430"/>
+          </a:xfrm>
+          <a:prstGeom prst="rect">
+            <a:avLst/>
+          </a:prstGeom>
+          <a:noFill/>
+        </p:spPr>
+        <p:txBody>
+          <a:bodyPr wrap="square" rtlCol="0">
+            <a:spAutoFit/>
+          </a:bodyPr>
+          <a:lstStyle/>
+          <a:p>
+            <a:r>
+              <a:rPr lang="en-US" sz="1200" dirty="0">
+                <a:solidFill>
+                  <a:srgbClr val="00B0F0"/>
+                </a:solidFill>
+              </a:rPr>
+              <a:t>Import Link from `next/link`;</a:t>
+            </a:r>
+          </a:p>
+          <a:p>
+            <a:endParaRPr lang="en-US" sz="1200" dirty="0">
+              <a:solidFill>
+                <a:srgbClr val="00B0F0"/>
+              </a:solidFill>
+            </a:endParaRPr>
+          </a:p>
+          <a:p>
+            <a:r>
+              <a:rPr lang="en-US" sz="1200" dirty="0" err="1">
+                <a:solidFill>
+                  <a:srgbClr val="00B0F0"/>
+                </a:solidFill>
+              </a:rPr>
+              <a:t>Cosnt</a:t>
+            </a:r>
+            <a:r>
+              <a:rPr lang="en-US" sz="1200" dirty="0">
+                <a:solidFill>
+                  <a:srgbClr val="00B0F0"/>
+                </a:solidFill>
+              </a:rPr>
+              <a:t> Home = () =&gt;{</a:t>
+            </a:r>
+          </a:p>
+          <a:p>
+            <a:r>
+              <a:rPr lang="en-US" sz="1200" dirty="0">
+                <a:solidFill>
+                  <a:srgbClr val="00B0F0"/>
+                </a:solidFill>
+              </a:rPr>
+              <a:t>	Return &lt;Link </a:t>
+            </a:r>
+            <a:r>
+              <a:rPr lang="en-US" sz="1200" dirty="0" err="1">
+                <a:solidFill>
+                  <a:srgbClr val="00B0F0"/>
+                </a:solidFill>
+              </a:rPr>
+              <a:t>href</a:t>
+            </a:r>
+            <a:r>
+              <a:rPr lang="en-US" sz="1200" dirty="0">
+                <a:solidFill>
+                  <a:srgbClr val="00B0F0"/>
+                </a:solidFill>
+              </a:rPr>
+              <a:t>=`posts`&gt;post page&lt;/Link&gt;</a:t>
+            </a:r>
+          </a:p>
+          <a:p>
+            <a:r>
+              <a:rPr lang="en-US" sz="1200" dirty="0">
+                <a:solidFill>
+                  <a:srgbClr val="00B0F0"/>
+                </a:solidFill>
+              </a:rPr>
+              <a:t>}</a:t>
+            </a:r>
+          </a:p>
+          <a:p>
+            <a:r>
+              <a:rPr lang="en-US" sz="1200" dirty="0">
+                <a:solidFill>
+                  <a:srgbClr val="00B0F0"/>
+                </a:solidFill>
+              </a:rPr>
+              <a:t>Export default Home;</a:t>
+            </a:r>
+          </a:p>
+          <a:p>
+            <a:endParaRPr lang="en-US" sz="1200" dirty="0">
+              <a:solidFill>
+                <a:srgbClr val="00B0F0"/>
+              </a:solidFill>
+            </a:endParaRPr>
+          </a:p>
+          <a:p>
+            <a:r>
+              <a:rPr lang="en-US" sz="1600" dirty="0"/>
+              <a:t>If we want button what we do ? </a:t>
+            </a:r>
+          </a:p>
+          <a:p>
+            <a:endParaRPr lang="en-US" sz="1600" dirty="0"/>
+          </a:p>
+          <a:p>
+            <a:r>
+              <a:rPr lang="en-US" sz="1200" dirty="0">
+                <a:solidFill>
+                  <a:srgbClr val="00B0F0"/>
+                </a:solidFill>
+              </a:rPr>
+              <a:t>Import {</a:t>
+            </a:r>
+            <a:r>
+              <a:rPr lang="en-US" sz="1200" dirty="0" err="1">
+                <a:solidFill>
+                  <a:srgbClr val="00B0F0"/>
+                </a:solidFill>
+              </a:rPr>
+              <a:t>useRouter</a:t>
+            </a:r>
+            <a:r>
+              <a:rPr lang="en-US" sz="1200" dirty="0">
+                <a:solidFill>
+                  <a:srgbClr val="00B0F0"/>
+                </a:solidFill>
+              </a:rPr>
+              <a:t>} from ‘next/router’;</a:t>
+            </a:r>
+          </a:p>
+          <a:p>
+            <a:r>
+              <a:rPr lang="en-US" sz="1200" dirty="0" err="1">
+                <a:solidFill>
+                  <a:srgbClr val="00B0F0"/>
+                </a:solidFill>
+              </a:rPr>
+              <a:t>Cosnt</a:t>
+            </a:r>
+            <a:r>
+              <a:rPr lang="en-US" sz="1200" dirty="0">
+                <a:solidFill>
+                  <a:srgbClr val="00B0F0"/>
+                </a:solidFill>
+              </a:rPr>
+              <a:t> Home = () =&gt;{</a:t>
+            </a:r>
+          </a:p>
+          <a:p>
+            <a:pPr lvl="1"/>
+            <a:r>
+              <a:rPr lang="en-US" sz="1200" dirty="0">
+                <a:solidFill>
+                  <a:srgbClr val="00B0F0"/>
+                </a:solidFill>
+              </a:rPr>
+              <a:t>Const router = </a:t>
+            </a:r>
+            <a:r>
+              <a:rPr lang="en-US" sz="1200" dirty="0" err="1">
+                <a:solidFill>
+                  <a:srgbClr val="00B0F0"/>
+                </a:solidFill>
+              </a:rPr>
+              <a:t>useRouter</a:t>
+            </a:r>
+            <a:r>
+              <a:rPr lang="en-US" sz="1200" dirty="0">
+                <a:solidFill>
+                  <a:srgbClr val="00B0F0"/>
+                </a:solidFill>
+              </a:rPr>
+              <a:t>();</a:t>
+            </a:r>
+          </a:p>
+          <a:p>
+            <a:pPr lvl="1"/>
+            <a:r>
+              <a:rPr lang="en-US" sz="1200" dirty="0">
+                <a:solidFill>
+                  <a:srgbClr val="00B0F0"/>
+                </a:solidFill>
+              </a:rPr>
+              <a:t>Const </a:t>
+            </a:r>
+            <a:r>
+              <a:rPr lang="en-US" sz="1200" dirty="0" err="1">
+                <a:solidFill>
+                  <a:srgbClr val="00B0F0"/>
+                </a:solidFill>
+              </a:rPr>
+              <a:t>clickHandler</a:t>
+            </a:r>
+            <a:r>
+              <a:rPr lang="en-US" sz="1200" dirty="0">
+                <a:solidFill>
+                  <a:srgbClr val="00B0F0"/>
+                </a:solidFill>
+              </a:rPr>
+              <a:t> = () =&gt;{</a:t>
+            </a:r>
+          </a:p>
+          <a:p>
+            <a:pPr lvl="1"/>
+            <a:r>
+              <a:rPr lang="en-US" sz="1200" dirty="0">
+                <a:solidFill>
+                  <a:srgbClr val="00B0F0"/>
+                </a:solidFill>
+              </a:rPr>
+              <a:t>	</a:t>
+            </a:r>
+            <a:r>
+              <a:rPr lang="en-US" sz="1200" dirty="0" err="1">
+                <a:solidFill>
+                  <a:srgbClr val="00B0F0"/>
+                </a:solidFill>
+              </a:rPr>
+              <a:t>router.push</a:t>
+            </a:r>
+            <a:r>
+              <a:rPr lang="en-US" sz="1200" dirty="0">
+                <a:solidFill>
+                  <a:srgbClr val="00B0F0"/>
+                </a:solidFill>
+              </a:rPr>
+              <a:t>(“/”);</a:t>
+            </a:r>
+          </a:p>
+          <a:p>
+            <a:pPr lvl="1"/>
+            <a:r>
+              <a:rPr lang="en-US" sz="1200" dirty="0">
+                <a:solidFill>
+                  <a:srgbClr val="00B0F0"/>
+                </a:solidFill>
+              </a:rPr>
+              <a:t>}	</a:t>
+            </a:r>
+          </a:p>
+          <a:p>
+            <a:r>
+              <a:rPr lang="en-US" sz="1200" dirty="0">
+                <a:solidFill>
+                  <a:srgbClr val="00B0F0"/>
+                </a:solidFill>
+              </a:rPr>
+              <a:t>	Return &lt;button </a:t>
+            </a:r>
+            <a:r>
+              <a:rPr lang="en-US" sz="1200" dirty="0" err="1">
+                <a:solidFill>
+                  <a:srgbClr val="00B0F0"/>
+                </a:solidFill>
+              </a:rPr>
+              <a:t>onClick</a:t>
+            </a:r>
+            <a:r>
+              <a:rPr lang="en-US" sz="1200" dirty="0">
+                <a:solidFill>
+                  <a:srgbClr val="00B0F0"/>
+                </a:solidFill>
+              </a:rPr>
+              <a:t>={</a:t>
+            </a:r>
+            <a:r>
+              <a:rPr lang="en-US" sz="1200" dirty="0" err="1">
+                <a:solidFill>
+                  <a:srgbClr val="00B0F0"/>
+                </a:solidFill>
+              </a:rPr>
+              <a:t>clickHandler</a:t>
+            </a:r>
+            <a:r>
+              <a:rPr lang="en-US" sz="1200" dirty="0">
+                <a:solidFill>
+                  <a:srgbClr val="00B0F0"/>
+                </a:solidFill>
+              </a:rPr>
+              <a:t>}&gt;post page&lt;/button&gt;</a:t>
+            </a:r>
+          </a:p>
+          <a:p>
+            <a:r>
+              <a:rPr lang="en-US" sz="1200" dirty="0">
+                <a:solidFill>
+                  <a:srgbClr val="00B0F0"/>
+                </a:solidFill>
+              </a:rPr>
+              <a:t>} // </a:t>
+            </a:r>
+            <a:r>
+              <a:rPr lang="en-US" sz="1200" dirty="0">
+                <a:solidFill>
+                  <a:srgbClr val="FFFF00"/>
+                </a:solidFill>
+              </a:rPr>
+              <a:t>but this one in </a:t>
+            </a:r>
+            <a:r>
+              <a:rPr lang="en-US" sz="1200" dirty="0" err="1">
+                <a:solidFill>
+                  <a:srgbClr val="FFFF00"/>
+                </a:solidFill>
+              </a:rPr>
+              <a:t>js</a:t>
+            </a:r>
+            <a:r>
+              <a:rPr lang="en-US" sz="1200" dirty="0">
+                <a:solidFill>
+                  <a:srgbClr val="FFFF00"/>
+                </a:solidFill>
+              </a:rPr>
+              <a:t> so absolutely we must run </a:t>
+            </a:r>
+            <a:r>
+              <a:rPr lang="en-US" sz="1200" dirty="0" err="1">
+                <a:solidFill>
+                  <a:srgbClr val="FFFF00"/>
+                </a:solidFill>
+              </a:rPr>
+              <a:t>js</a:t>
+            </a:r>
+            <a:r>
+              <a:rPr lang="en-US" sz="1200" dirty="0">
+                <a:solidFill>
+                  <a:srgbClr val="FFFF00"/>
+                </a:solidFill>
+              </a:rPr>
+              <a:t> on browser if </a:t>
+            </a:r>
+            <a:r>
+              <a:rPr lang="en-US" sz="1200" dirty="0" err="1">
+                <a:solidFill>
+                  <a:srgbClr val="FFFF00"/>
+                </a:solidFill>
+              </a:rPr>
+              <a:t>js</a:t>
+            </a:r>
+            <a:r>
+              <a:rPr lang="en-US" sz="1200" dirty="0">
+                <a:solidFill>
+                  <a:srgbClr val="FFFF00"/>
+                </a:solidFill>
+              </a:rPr>
+              <a:t> not load or any thing this not work</a:t>
+            </a:r>
+          </a:p>
+          <a:p>
+            <a:endParaRPr lang="en-US" sz="1200" dirty="0">
+              <a:solidFill>
+                <a:srgbClr val="00B0F0"/>
+              </a:solidFill>
+            </a:endParaRPr>
+          </a:p>
+        </p:txBody>
+      </p:sp>
+    </p:spTree>
+    <p:extLst>
+      <p:ext uri="{BB962C8B-B14F-4D97-AF65-F5344CB8AC3E}">
+        <p14:creationId xmlns:p14="http://schemas.microsoft.com/office/powerpoint/2010/main" val="3401031057"/>
+      </p:ext>
+    </p:extLst>
+  </p:cSld>
+  <p:clrMapOvr>
+    <a:masterClrMapping/>
+  </p:clrMapOvr>
+  <p:timing>
+    <p:tnLst>
+      <p:par>
+        <p:cTn id="1" dur="indefinite" restart="never" nodeType="tmRoot">
+          <p:childTnLst>
+            <p:seq concurrent="1" nextAc="seek">
+              <p:cTn id="2" dur="indefinite" nodeType="mainSeq">
+                <p:childTnLst>
+                  <p:par>
+                    <p:cTn id="3" fill="hold">
+                      <p:stCondLst>
+                        <p:cond delay="indefinite"/>
+                      </p:stCondLst>
+                      <p:childTnLst>
+                        <p:par>
+                          <p:cTn id="4" fill="hold">
+                            <p:stCondLst>
+                              <p:cond delay="0"/>
+                            </p:stCondLst>
+                            <p:childTnLst>
+                              <p:par>
+                                <p:cTn id="5" presetID="10" presetClass="entr" presetSubtype="0" fill="hold" grpId="0" nodeType="clickEffect">
+                                  <p:stCondLst>
+                                    <p:cond delay="0"/>
+                                  </p:stCondLst>
+                                  <p:childTnLst>
+                                    <p:set>
+                                      <p:cBhvr>
+                                        <p:cTn id="6" dur="1" fill="hold">
+                                          <p:stCondLst>
+                                            <p:cond delay="0"/>
+                                          </p:stCondLst>
+                                        </p:cTn>
+                                        <p:tgtEl>
+                                          <p:spTgt spid="4"/>
+                                        </p:tgtEl>
+                                        <p:attrNameLst>
+                                          <p:attrName>style.visibility</p:attrName>
+                                        </p:attrNameLst>
+                                      </p:cBhvr>
+                                      <p:to>
+                                        <p:strVal val="visible"/>
+                                      </p:to>
+                                    </p:set>
+                                    <p:animEffect transition="in" filter="fade">
+                                      <p:cBhvr>
+                                        <p:cTn id="7" dur="500"/>
+                                        <p:tgtEl>
+                                          <p:spTgt spid="4"/>
+                                        </p:tgtEl>
+                                      </p:cBhvr>
+                                    </p:animEffect>
+                                  </p:childTnLst>
+                                </p:cTn>
+                              </p:par>
+                            </p:childTnLst>
+                          </p:cTn>
+                        </p:par>
+                      </p:childTnLst>
+                    </p:cTn>
+                  </p:par>
+                  <p:par>
+                    <p:cTn id="8" fill="hold">
+                      <p:stCondLst>
+                        <p:cond delay="indefinite"/>
+                      </p:stCondLst>
+                      <p:childTnLst>
+                        <p:par>
+                          <p:cTn id="9" fill="hold">
+                            <p:stCondLst>
+                              <p:cond delay="0"/>
+                            </p:stCondLst>
+                            <p:childTnLst>
+                              <p:par>
+                                <p:cTn id="10" presetID="10" presetClass="entr" presetSubtype="0" fill="hold" grpId="0" nodeType="clickEffect">
+                                  <p:stCondLst>
+                                    <p:cond delay="0"/>
+                                  </p:stCondLst>
+                                  <p:childTnLst>
+                                    <p:set>
+                                      <p:cBhvr>
+                                        <p:cTn id="11" dur="1" fill="hold">
+                                          <p:stCondLst>
+                                            <p:cond delay="0"/>
+                                          </p:stCondLst>
+                                        </p:cTn>
+                                        <p:tgtEl>
+                                          <p:spTgt spid="5"/>
+                                        </p:tgtEl>
+                                        <p:attrNameLst>
+                                          <p:attrName>style.visibility</p:attrName>
+                                        </p:attrNameLst>
+                                      </p:cBhvr>
+                                      <p:to>
+                                        <p:strVal val="visible"/>
+                                      </p:to>
+                                    </p:set>
+                                    <p:animEffect transition="in" filter="fade">
+                                      <p:cBhvr>
+                                        <p:cTn id="12" dur="500"/>
+                                        <p:tgtEl>
+                                          <p:spTgt spid="5"/>
+                                        </p:tgtEl>
+                                      </p:cBhvr>
+                                    </p:animEffect>
+                                  </p:childTnLst>
+                                </p:cTn>
+                              </p:par>
+                            </p:childTnLst>
+                          </p:cTn>
+                        </p:par>
+                      </p:childTnLst>
+                    </p:cTn>
+                  </p:par>
+                </p:childTnLst>
+              </p:cTn>
+              <p:prevCondLst>
+                <p:cond evt="onPrev" delay="0">
+                  <p:tgtEl>
+                    <p:sldTgt/>
+                  </p:tgtEl>
+                </p:cond>
+              </p:prevCondLst>
+              <p:nextCondLst>
+                <p:cond evt="onNext" delay="0">
+                  <p:tgtEl>
+                    <p:sldTgt/>
+                  </p:tgtEl>
+                </p:cond>
+              </p:nextCondLst>
+            </p:seq>
+          </p:childTnLst>
+        </p:cTn>
+      </p:par>
+    </p:tnLst>
+    <p:bldLst>
+      <p:bldP spid="4" grpId="0" animBg="1"/>
+      <p:bldP spid="5" grpId="0"/>
+    </p:bldLst>
+  </p:timing>
+</p:sld>
+</file>
+
+<file path=ppt/slides/slide12.xml><?xml version="1.0" encoding="utf-8"?>
+<p:sld xmlns:a="http://schemas.openxmlformats.org/drawingml/2006/main" xmlns:r="http://schemas.openxmlformats.org/officeDocument/2006/relationships" xmlns:p="http://schemas.openxmlformats.org/presentationml/2006/main">
+  <p:cSld>
+    <p:spTree>
+      <p:nvGrpSpPr>
+        <p:cNvPr id="1" name=""/>
+        <p:cNvGrpSpPr/>
+        <p:nvPr/>
+      </p:nvGrpSpPr>
+      <p:grpSpPr>
+        <a:xfrm>
+          <a:off x="0" y="0"/>
+          <a:ext cx="0" cy="0"/>
+          <a:chOff x="0" y="0"/>
+          <a:chExt cx="0" cy="0"/>
+        </a:xfrm>
+      </p:grpSpPr>
+      <p:sp>
+        <p:nvSpPr>
+          <p:cNvPr id="2" name="Title 1">
+            <a:extLst>
+              <a:ext uri="{FF2B5EF4-FFF2-40B4-BE49-F238E27FC236}">
+                <a16:creationId xmlns:a16="http://schemas.microsoft.com/office/drawing/2014/main" id="{922502CE-784E-E2AB-7F96-D8D335B016FE}"/>
+              </a:ext>
+            </a:extLst>
+          </p:cNvPr>
+          <p:cNvSpPr>
+            <a:spLocks noGrp="1"/>
+          </p:cNvSpPr>
+          <p:nvPr>
+            <p:ph type="title"/>
+          </p:nvPr>
+        </p:nvSpPr>
+        <p:spPr/>
+        <p:txBody>
+          <a:bodyPr/>
+          <a:lstStyle/>
+          <a:p>
+            <a:r>
+              <a:rPr lang="en-US" dirty="0"/>
+              <a:t>Not found page 404</a:t>
+            </a:r>
+          </a:p>
+        </p:txBody>
+      </p:sp>
+      <p:sp>
+        <p:nvSpPr>
+          <p:cNvPr id="3" name="TextBox 2">
+            <a:extLst>
+              <a:ext uri="{FF2B5EF4-FFF2-40B4-BE49-F238E27FC236}">
+                <a16:creationId xmlns:a16="http://schemas.microsoft.com/office/drawing/2014/main" id="{452FEED4-C227-4922-8FDC-D56A73B9965C}"/>
+              </a:ext>
+            </a:extLst>
+          </p:cNvPr>
+          <p:cNvSpPr txBox="1"/>
+          <p:nvPr/>
+        </p:nvSpPr>
+        <p:spPr>
+          <a:xfrm>
+            <a:off x="408373" y="2281561"/>
+            <a:ext cx="9783192" cy="923330"/>
+          </a:xfrm>
+          <a:prstGeom prst="rect">
+            <a:avLst/>
+          </a:prstGeom>
+          <a:noFill/>
+        </p:spPr>
+        <p:txBody>
+          <a:bodyPr wrap="square" rtlCol="0">
+            <a:spAutoFit/>
+          </a:bodyPr>
+          <a:lstStyle/>
+          <a:p>
+            <a:r>
+              <a:rPr lang="en-US" dirty="0"/>
+              <a:t>In next.js as default build 404 page if we want style to 404 or personal 404 page we must in root of pages folder create 404.js and special components =&gt; now we can edit or any thing  …</a:t>
+            </a:r>
+          </a:p>
+        </p:txBody>
+      </p:sp>
+    </p:spTree>
+    <p:extLst>
+      <p:ext uri="{BB962C8B-B14F-4D97-AF65-F5344CB8AC3E}">
+        <p14:creationId xmlns:p14="http://schemas.microsoft.com/office/powerpoint/2010/main" val="3352281716"/>
+      </p:ext>
+    </p:extLst>
+  </p:cSld>
+  <p:clrMapOvr>
+    <a:masterClrMapping/>
+  </p:clrMapOvr>
+  <p:timing>
+    <p:tnLst>
+      <p:par>
+        <p:cTn id="1" dur="indefinite" restart="never" nodeType="tmRoot">
+          <p:childTnLst>
+            <p:seq concurrent="1" nextAc="seek">
+              <p:cTn id="2" dur="indefinite" nodeType="mainSeq">
+                <p:childTnLst>
+                  <p:par>
+                    <p:cTn id="3" fill="hold">
+                      <p:stCondLst>
+                        <p:cond delay="indefinite"/>
+                      </p:stCondLst>
+                      <p:childTnLst>
+                        <p:par>
+                          <p:cTn id="4" fill="hold">
+                            <p:stCondLst>
+                              <p:cond delay="0"/>
+                            </p:stCondLst>
+                            <p:childTnLst>
+                              <p:par>
+                                <p:cTn id="5" presetID="10" presetClass="entr" presetSubtype="0" fill="hold" grpId="0" nodeType="clickEffect">
+                                  <p:stCondLst>
+                                    <p:cond delay="0"/>
+                                  </p:stCondLst>
+                                  <p:childTnLst>
+                                    <p:set>
+                                      <p:cBhvr>
+                                        <p:cTn id="6" dur="1" fill="hold">
+                                          <p:stCondLst>
+                                            <p:cond delay="0"/>
+                                          </p:stCondLst>
+                                        </p:cTn>
+                                        <p:tgtEl>
+                                          <p:spTgt spid="3"/>
+                                        </p:tgtEl>
+                                        <p:attrNameLst>
+                                          <p:attrName>style.visibility</p:attrName>
+                                        </p:attrNameLst>
+                                      </p:cBhvr>
+                                      <p:to>
+                                        <p:strVal val="visible"/>
+                                      </p:to>
+                                    </p:set>
+                                    <p:animEffect transition="in" filter="fade">
+                                      <p:cBhvr>
+                                        <p:cTn id="7" dur="500"/>
+                                        <p:tgtEl>
+                                          <p:spTgt spid="3"/>
+                                        </p:tgtEl>
+                                      </p:cBhvr>
+                                    </p:animEffect>
+                                  </p:childTnLst>
+                                </p:cTn>
+                              </p:par>
+                            </p:childTnLst>
+                          </p:cTn>
+                        </p:par>
+                      </p:childTnLst>
+                    </p:cTn>
+                  </p:par>
+                </p:childTnLst>
+              </p:cTn>
+              <p:prevCondLst>
+                <p:cond evt="onPrev" delay="0">
+                  <p:tgtEl>
+                    <p:sldTgt/>
+                  </p:tgtEl>
+                </p:cond>
+              </p:prevCondLst>
+              <p:nextCondLst>
+                <p:cond evt="onNext" delay="0">
+                  <p:tgtEl>
+                    <p:sldTgt/>
+                  </p:tgtEl>
+                </p:cond>
+              </p:nextCondLst>
+            </p:seq>
+          </p:childTnLst>
+        </p:cTn>
+      </p:par>
+    </p:tnLst>
+    <p:bldLst>
+      <p:bldP spid="3" grpId="0"/>
+    </p:bldLst>
+  </p:timing>
+</p:sld>
+</file>
+
+<file path=ppt/slides/slide13.xml><?xml version="1.0" encoding="utf-8"?>
+<p:sld xmlns:a="http://schemas.openxmlformats.org/drawingml/2006/main" xmlns:r="http://schemas.openxmlformats.org/officeDocument/2006/relationships" xmlns:p="http://schemas.openxmlformats.org/presentationml/2006/main">
+  <p:cSld>
+    <p:spTree>
+      <p:nvGrpSpPr>
+        <p:cNvPr id="1" name=""/>
+        <p:cNvGrpSpPr/>
+        <p:nvPr/>
+      </p:nvGrpSpPr>
+      <p:grpSpPr>
+        <a:xfrm>
+          <a:off x="0" y="0"/>
+          <a:ext cx="0" cy="0"/>
+          <a:chOff x="0" y="0"/>
+          <a:chExt cx="0" cy="0"/>
+        </a:xfrm>
+      </p:grpSpPr>
+      <p:sp>
+        <p:nvSpPr>
+          <p:cNvPr id="2" name="Title 1">
+            <a:extLst>
+              <a:ext uri="{FF2B5EF4-FFF2-40B4-BE49-F238E27FC236}">
+                <a16:creationId xmlns:a16="http://schemas.microsoft.com/office/drawing/2014/main" id="{A2B0C9A3-100A-3D9E-C2CF-6B018948CD93}"/>
+              </a:ext>
+            </a:extLst>
+          </p:cNvPr>
+          <p:cNvSpPr>
+            <a:spLocks noGrp="1"/>
+          </p:cNvSpPr>
+          <p:nvPr>
+            <p:ph type="ctrTitle"/>
+          </p:nvPr>
+        </p:nvSpPr>
+        <p:spPr/>
+        <p:txBody>
+          <a:bodyPr/>
+          <a:lstStyle/>
+          <a:p>
+            <a:pPr algn="l"/>
+            <a:r>
+              <a:rPr lang="en-US" dirty="0"/>
+              <a:t>Season 2 </a:t>
+            </a:r>
+          </a:p>
+        </p:txBody>
+      </p:sp>
+      <p:sp>
+        <p:nvSpPr>
+          <p:cNvPr id="3" name="Subtitle 2">
+            <a:extLst>
+              <a:ext uri="{FF2B5EF4-FFF2-40B4-BE49-F238E27FC236}">
+                <a16:creationId xmlns:a16="http://schemas.microsoft.com/office/drawing/2014/main" id="{9EE3C166-52C1-85DE-95D9-90A2F37011A0}"/>
+              </a:ext>
+            </a:extLst>
+          </p:cNvPr>
+          <p:cNvSpPr>
+            <a:spLocks noGrp="1"/>
+          </p:cNvSpPr>
+          <p:nvPr>
+            <p:ph type="subTitle" idx="1"/>
+          </p:nvPr>
+        </p:nvSpPr>
+        <p:spPr/>
+        <p:txBody>
+          <a:bodyPr/>
+          <a:lstStyle/>
+          <a:p>
+            <a:pPr algn="l"/>
+            <a:r>
+              <a:rPr lang="en-US" dirty="0"/>
+              <a:t>SEO in </a:t>
+            </a:r>
+            <a:r>
+              <a:rPr lang="en-US" dirty="0" err="1"/>
+              <a:t>javascript</a:t>
+            </a:r>
+            <a:r>
+              <a:rPr lang="en-US" dirty="0"/>
+              <a:t> application	</a:t>
+            </a:r>
+          </a:p>
+        </p:txBody>
+      </p:sp>
+    </p:spTree>
+    <p:extLst>
+      <p:ext uri="{BB962C8B-B14F-4D97-AF65-F5344CB8AC3E}">
+        <p14:creationId xmlns:p14="http://schemas.microsoft.com/office/powerpoint/2010/main" val="3523102328"/>
+      </p:ext>
+    </p:extLst>
+  </p:cSld>
+  <p:clrMapOvr>
+    <a:masterClrMapping/>
+  </p:clrMapOvr>
+</p:sld>
+</file>
+
+<file path=ppt/slides/slide14.xml><?xml version="1.0" encoding="utf-8"?>
+<p:sld xmlns:a="http://schemas.openxmlformats.org/drawingml/2006/main" xmlns:r="http://schemas.openxmlformats.org/officeDocument/2006/relationships" xmlns:p="http://schemas.openxmlformats.org/presentationml/2006/main">
+  <p:cSld>
+    <p:spTree>
+      <p:nvGrpSpPr>
+        <p:cNvPr id="1" name=""/>
+        <p:cNvGrpSpPr/>
+        <p:nvPr/>
+      </p:nvGrpSpPr>
+      <p:grpSpPr>
+        <a:xfrm>
+          <a:off x="0" y="0"/>
+          <a:ext cx="0" cy="0"/>
+          <a:chOff x="0" y="0"/>
+          <a:chExt cx="0" cy="0"/>
+        </a:xfrm>
+      </p:grpSpPr>
+      <p:sp>
+        <p:nvSpPr>
+          <p:cNvPr id="2" name="Title 1">
+            <a:extLst>
+              <a:ext uri="{FF2B5EF4-FFF2-40B4-BE49-F238E27FC236}">
+                <a16:creationId xmlns:a16="http://schemas.microsoft.com/office/drawing/2014/main" id="{55E7F87C-2579-2D41-19B0-FE1DF7D9DC77}"/>
+              </a:ext>
+            </a:extLst>
+          </p:cNvPr>
+          <p:cNvSpPr>
+            <a:spLocks noGrp="1"/>
+          </p:cNvSpPr>
+          <p:nvPr>
+            <p:ph type="title"/>
+          </p:nvPr>
+        </p:nvSpPr>
+        <p:spPr/>
+        <p:txBody>
+          <a:bodyPr/>
+          <a:lstStyle/>
+          <a:p>
+            <a:r>
+              <a:rPr lang="en-US" dirty="0"/>
+              <a:t>Pre Rendering and data fetching </a:t>
+            </a:r>
+          </a:p>
+        </p:txBody>
+      </p:sp>
+      <p:sp>
+        <p:nvSpPr>
+          <p:cNvPr id="3" name="TextBox 2">
+            <a:extLst>
+              <a:ext uri="{FF2B5EF4-FFF2-40B4-BE49-F238E27FC236}">
+                <a16:creationId xmlns:a16="http://schemas.microsoft.com/office/drawing/2014/main" id="{886385A4-D131-7A36-185E-4FBB79EBE5FC}"/>
+              </a:ext>
+            </a:extLst>
+          </p:cNvPr>
+          <p:cNvSpPr txBox="1"/>
+          <p:nvPr/>
+        </p:nvSpPr>
+        <p:spPr>
+          <a:xfrm>
+            <a:off x="680321" y="2219417"/>
+            <a:ext cx="9688797" cy="2031325"/>
+          </a:xfrm>
+          <a:prstGeom prst="rect">
+            <a:avLst/>
+          </a:prstGeom>
+          <a:noFill/>
+        </p:spPr>
+        <p:txBody>
+          <a:bodyPr wrap="square" rtlCol="0">
+            <a:spAutoFit/>
+          </a:bodyPr>
+          <a:lstStyle/>
+          <a:p>
+            <a:r>
+              <a:rPr lang="en-US" dirty="0"/>
+              <a:t>In React app or vue.js app … any app make with </a:t>
+            </a:r>
+            <a:r>
+              <a:rPr lang="en-US" dirty="0" err="1"/>
+              <a:t>js</a:t>
+            </a:r>
+            <a:r>
+              <a:rPr lang="fa-IR" dirty="0"/>
+              <a:t> </a:t>
+            </a:r>
+            <a:r>
+              <a:rPr lang="en-US" dirty="0"/>
+              <a:t> SEO problem it’s mean  if </a:t>
+            </a:r>
+            <a:r>
+              <a:rPr lang="en-US" dirty="0" err="1"/>
+              <a:t>js</a:t>
+            </a:r>
+            <a:r>
+              <a:rPr lang="en-US" dirty="0"/>
+              <a:t> in browser not working or stop </a:t>
+            </a:r>
+            <a:r>
+              <a:rPr lang="en-US" dirty="0" err="1"/>
+              <a:t>js</a:t>
+            </a:r>
+            <a:r>
+              <a:rPr lang="en-US" dirty="0"/>
+              <a:t> app not render in browser </a:t>
+            </a:r>
+          </a:p>
+          <a:p>
+            <a:r>
+              <a:rPr lang="en-US" dirty="0"/>
+              <a:t>If you go to  view page source see on element with one id or class and in SEO (google bot) not see this Element for SEO</a:t>
+            </a:r>
+          </a:p>
+          <a:p>
+            <a:r>
+              <a:rPr lang="en-US" dirty="0"/>
+              <a:t>So in next fix this problem  it’s prerendering data fetching  =&gt; it’s  mean if stop  </a:t>
+            </a:r>
+            <a:r>
+              <a:rPr lang="en-US" dirty="0" err="1"/>
+              <a:t>js</a:t>
+            </a:r>
+            <a:r>
+              <a:rPr lang="en-US" dirty="0"/>
+              <a:t> this app build and convert .html file and (google bot ) see this Element and SEO is fixable . </a:t>
+            </a:r>
+          </a:p>
+          <a:p>
+            <a:r>
+              <a:rPr lang="en-US" dirty="0"/>
+              <a:t>Notice : next.js pre-rendering on all pages by defaults.</a:t>
+            </a:r>
+          </a:p>
+        </p:txBody>
+      </p:sp>
+    </p:spTree>
+    <p:extLst>
+      <p:ext uri="{BB962C8B-B14F-4D97-AF65-F5344CB8AC3E}">
+        <p14:creationId xmlns:p14="http://schemas.microsoft.com/office/powerpoint/2010/main" val="4093163702"/>
+      </p:ext>
+    </p:extLst>
+  </p:cSld>
+  <p:clrMapOvr>
+    <a:masterClrMapping/>
+  </p:clrMapOvr>
+  <p:timing>
+    <p:tnLst>
+      <p:par>
+        <p:cTn id="1" dur="indefinite" restart="never" nodeType="tmRoot">
+          <p:childTnLst>
+            <p:seq concurrent="1" nextAc="seek">
+              <p:cTn id="2" dur="indefinite" nodeType="mainSeq">
+                <p:childTnLst>
+                  <p:par>
+                    <p:cTn id="3" fill="hold">
+                      <p:stCondLst>
+                        <p:cond delay="indefinite"/>
+                      </p:stCondLst>
+                      <p:childTnLst>
+                        <p:par>
+                          <p:cTn id="4" fill="hold">
+                            <p:stCondLst>
+                              <p:cond delay="0"/>
+                            </p:stCondLst>
+                            <p:childTnLst>
+                              <p:par>
+                                <p:cTn id="5" presetID="10" presetClass="entr" presetSubtype="0" fill="hold" grpId="0" nodeType="clickEffect">
+                                  <p:stCondLst>
+                                    <p:cond delay="0"/>
+                                  </p:stCondLst>
+                                  <p:childTnLst>
+                                    <p:set>
+                                      <p:cBhvr>
+                                        <p:cTn id="6" dur="1" fill="hold">
+                                          <p:stCondLst>
+                                            <p:cond delay="0"/>
+                                          </p:stCondLst>
+                                        </p:cTn>
+                                        <p:tgtEl>
+                                          <p:spTgt spid="3"/>
+                                        </p:tgtEl>
+                                        <p:attrNameLst>
+                                          <p:attrName>style.visibility</p:attrName>
+                                        </p:attrNameLst>
+                                      </p:cBhvr>
+                                      <p:to>
+                                        <p:strVal val="visible"/>
+                                      </p:to>
+                                    </p:set>
+                                    <p:animEffect transition="in" filter="fade">
+                                      <p:cBhvr>
+                                        <p:cTn id="7" dur="500"/>
+                                        <p:tgtEl>
+                                          <p:spTgt spid="3"/>
+                                        </p:tgtEl>
+                                      </p:cBhvr>
+                                    </p:animEffect>
+                                  </p:childTnLst>
+                                </p:cTn>
+                              </p:par>
+                            </p:childTnLst>
+                          </p:cTn>
+                        </p:par>
+                      </p:childTnLst>
+                    </p:cTn>
+                  </p:par>
+                </p:childTnLst>
+              </p:cTn>
+              <p:prevCondLst>
+                <p:cond evt="onPrev" delay="0">
+                  <p:tgtEl>
+                    <p:sldTgt/>
+                  </p:tgtEl>
+                </p:cond>
+              </p:prevCondLst>
+              <p:nextCondLst>
+                <p:cond evt="onNext" delay="0">
+                  <p:tgtEl>
+                    <p:sldTgt/>
+                  </p:tgtEl>
+                </p:cond>
+              </p:nextCondLst>
+            </p:seq>
+          </p:childTnLst>
+        </p:cTn>
+      </p:par>
+    </p:tnLst>
+    <p:bldLst>
+      <p:bldP spid="3" grpId="0"/>
+    </p:bldLst>
+  </p:timing>
+</p:sld>
+</file>
+
+<file path=ppt/slides/slide15.xml><?xml version="1.0" encoding="utf-8"?>
+<p:sld xmlns:a="http://schemas.openxmlformats.org/drawingml/2006/main" xmlns:r="http://schemas.openxmlformats.org/officeDocument/2006/relationships" xmlns:p="http://schemas.openxmlformats.org/presentationml/2006/main">
+  <p:cSld>
+    <p:spTree>
+      <p:nvGrpSpPr>
+        <p:cNvPr id="1" name=""/>
+        <p:cNvGrpSpPr/>
+        <p:nvPr/>
+      </p:nvGrpSpPr>
+      <p:grpSpPr>
+        <a:xfrm>
+          <a:off x="0" y="0"/>
+          <a:ext cx="0" cy="0"/>
+          <a:chOff x="0" y="0"/>
+          <a:chExt cx="0" cy="0"/>
+        </a:xfrm>
+      </p:grpSpPr>
+      <p:sp>
+        <p:nvSpPr>
+          <p:cNvPr id="2" name="Title 1">
+            <a:extLst>
+              <a:ext uri="{FF2B5EF4-FFF2-40B4-BE49-F238E27FC236}">
+                <a16:creationId xmlns:a16="http://schemas.microsoft.com/office/drawing/2014/main" id="{964FD262-7C11-E458-5E88-0832CC03E934}"/>
+              </a:ext>
+            </a:extLst>
+          </p:cNvPr>
+          <p:cNvSpPr>
+            <a:spLocks noGrp="1"/>
+          </p:cNvSpPr>
+          <p:nvPr>
+            <p:ph type="title"/>
+          </p:nvPr>
+        </p:nvSpPr>
+        <p:spPr/>
+        <p:txBody>
+          <a:bodyPr/>
+          <a:lstStyle/>
+          <a:p>
+            <a:r>
+              <a:rPr lang="en-US" dirty="0"/>
+              <a:t>Pre Rendering </a:t>
+            </a:r>
+          </a:p>
+        </p:txBody>
+      </p:sp>
+      <p:sp>
+        <p:nvSpPr>
+          <p:cNvPr id="3" name="TextBox 2">
+            <a:extLst>
+              <a:ext uri="{FF2B5EF4-FFF2-40B4-BE49-F238E27FC236}">
+                <a16:creationId xmlns:a16="http://schemas.microsoft.com/office/drawing/2014/main" id="{5847E287-33A9-4416-21F5-A49A0968FCE0}"/>
+              </a:ext>
+            </a:extLst>
+          </p:cNvPr>
+          <p:cNvSpPr txBox="1"/>
+          <p:nvPr/>
+        </p:nvSpPr>
+        <p:spPr>
+          <a:xfrm>
+            <a:off x="559293" y="2512381"/>
+            <a:ext cx="9712171" cy="1477328"/>
+          </a:xfrm>
+          <a:prstGeom prst="rect">
+            <a:avLst/>
+          </a:prstGeom>
+          <a:noFill/>
+        </p:spPr>
+        <p:txBody>
+          <a:bodyPr wrap="square" rtlCol="0">
+            <a:spAutoFit/>
+          </a:bodyPr>
+          <a:lstStyle/>
+          <a:p>
+            <a:r>
+              <a:rPr lang="en-US" dirty="0"/>
+              <a:t>In Next.js as two factor for pre </a:t>
+            </a:r>
+            <a:r>
+              <a:rPr lang="en-US" dirty="0" err="1"/>
+              <a:t>renderinh</a:t>
+            </a:r>
+            <a:r>
+              <a:rPr lang="en-US" dirty="0"/>
+              <a:t> : </a:t>
+            </a:r>
+          </a:p>
+          <a:p>
+            <a:r>
+              <a:rPr lang="en-US" dirty="0"/>
+              <a:t>1- </a:t>
+            </a:r>
+            <a:r>
+              <a:rPr lang="en-US" b="1" dirty="0"/>
+              <a:t>static Generation </a:t>
+            </a:r>
+            <a:r>
+              <a:rPr lang="en-US" dirty="0"/>
+              <a:t>=&gt; is the pre rendering method that generation at html build time .the html  is then reused on each Request.</a:t>
+            </a:r>
+          </a:p>
+          <a:p>
+            <a:r>
+              <a:rPr lang="en-US" dirty="0"/>
+              <a:t>2- </a:t>
+            </a:r>
+            <a:r>
+              <a:rPr lang="en-US" b="1" dirty="0"/>
+              <a:t>server-side Routing </a:t>
+            </a:r>
+            <a:r>
+              <a:rPr lang="en-US" dirty="0"/>
+              <a:t> =&gt; the generate html  on each </a:t>
+            </a:r>
+            <a:r>
+              <a:rPr lang="en-US" dirty="0" err="1"/>
+              <a:t>requeset</a:t>
+            </a:r>
+            <a:r>
+              <a:rPr lang="en-US" dirty="0"/>
+              <a:t> .</a:t>
+            </a:r>
+            <a:endParaRPr lang="en-US" b="1" dirty="0"/>
+          </a:p>
+          <a:p>
+            <a:r>
+              <a:rPr lang="en-US" dirty="0"/>
+              <a:t>The difference is when is generate HTML page .</a:t>
+            </a:r>
+          </a:p>
+        </p:txBody>
+      </p:sp>
+    </p:spTree>
+    <p:extLst>
+      <p:ext uri="{BB962C8B-B14F-4D97-AF65-F5344CB8AC3E}">
+        <p14:creationId xmlns:p14="http://schemas.microsoft.com/office/powerpoint/2010/main" val="3989365610"/>
+      </p:ext>
+    </p:extLst>
+  </p:cSld>
+  <p:clrMapOvr>
+    <a:masterClrMapping/>
+  </p:clrMapOvr>
+  <p:timing>
+    <p:tnLst>
+      <p:par>
+        <p:cTn id="1" dur="indefinite" restart="never" nodeType="tmRoot">
+          <p:childTnLst>
+            <p:seq concurrent="1" nextAc="seek">
+              <p:cTn id="2" dur="indefinite" nodeType="mainSeq">
+                <p:childTnLst>
+                  <p:par>
+                    <p:cTn id="3" fill="hold">
+                      <p:stCondLst>
+                        <p:cond delay="indefinite"/>
+                      </p:stCondLst>
+                      <p:childTnLst>
+                        <p:par>
+                          <p:cTn id="4" fill="hold">
+                            <p:stCondLst>
+                              <p:cond delay="0"/>
+                            </p:stCondLst>
+                            <p:childTnLst>
+                              <p:par>
+                                <p:cTn id="5" presetID="10" presetClass="entr" presetSubtype="0" fill="hold" grpId="0" nodeType="clickEffect">
+                                  <p:stCondLst>
+                                    <p:cond delay="0"/>
+                                  </p:stCondLst>
+                                  <p:childTnLst>
+                                    <p:set>
+                                      <p:cBhvr>
+                                        <p:cTn id="6" dur="1" fill="hold">
+                                          <p:stCondLst>
+                                            <p:cond delay="0"/>
+                                          </p:stCondLst>
+                                        </p:cTn>
+                                        <p:tgtEl>
+                                          <p:spTgt spid="3"/>
+                                        </p:tgtEl>
+                                        <p:attrNameLst>
+                                          <p:attrName>style.visibility</p:attrName>
+                                        </p:attrNameLst>
+                                      </p:cBhvr>
+                                      <p:to>
+                                        <p:strVal val="visible"/>
+                                      </p:to>
+                                    </p:set>
+                                    <p:animEffect transition="in" filter="fade">
+                                      <p:cBhvr>
+                                        <p:cTn id="7" dur="500"/>
+                                        <p:tgtEl>
+                                          <p:spTgt spid="3"/>
+                                        </p:tgtEl>
+                                      </p:cBhvr>
+                                    </p:animEffect>
+                                  </p:childTnLst>
+                                </p:cTn>
+                              </p:par>
+                            </p:childTnLst>
+                          </p:cTn>
+                        </p:par>
+                      </p:childTnLst>
+                    </p:cTn>
+                  </p:par>
+                </p:childTnLst>
+              </p:cTn>
+              <p:prevCondLst>
+                <p:cond evt="onPrev" delay="0">
+                  <p:tgtEl>
+                    <p:sldTgt/>
+                  </p:tgtEl>
+                </p:cond>
+              </p:prevCondLst>
+              <p:nextCondLst>
+                <p:cond evt="onNext" delay="0">
+                  <p:tgtEl>
+                    <p:sldTgt/>
+                  </p:tgtEl>
+                </p:cond>
+              </p:nextCondLst>
+            </p:seq>
+          </p:childTnLst>
+        </p:cTn>
+      </p:par>
+    </p:tnLst>
+    <p:bldLst>
+      <p:bldP spid="3" grpId="0"/>
+    </p:bldLst>
+  </p:timing>
+</p:sld>
+</file>
+
+<file path=ppt/slides/slide16.xml><?xml version="1.0" encoding="utf-8"?>
+<p:sld xmlns:a="http://schemas.openxmlformats.org/drawingml/2006/main" xmlns:r="http://schemas.openxmlformats.org/officeDocument/2006/relationships" xmlns:p="http://schemas.openxmlformats.org/presentationml/2006/main">
+  <p:cSld>
+    <p:spTree>
+      <p:nvGrpSpPr>
+        <p:cNvPr id="1" name=""/>
+        <p:cNvGrpSpPr/>
+        <p:nvPr/>
+      </p:nvGrpSpPr>
+      <p:grpSpPr>
+        <a:xfrm>
+          <a:off x="0" y="0"/>
+          <a:ext cx="0" cy="0"/>
+          <a:chOff x="0" y="0"/>
+          <a:chExt cx="0" cy="0"/>
+        </a:xfrm>
+      </p:grpSpPr>
+      <p:sp>
+        <p:nvSpPr>
+          <p:cNvPr id="2" name="Title 1">
+            <a:extLst>
+              <a:ext uri="{FF2B5EF4-FFF2-40B4-BE49-F238E27FC236}">
+                <a16:creationId xmlns:a16="http://schemas.microsoft.com/office/drawing/2014/main" id="{5482CA1F-4E45-9107-BD85-32DE5AD86FAE}"/>
+              </a:ext>
+            </a:extLst>
+          </p:cNvPr>
+          <p:cNvSpPr>
+            <a:spLocks noGrp="1"/>
+          </p:cNvSpPr>
+          <p:nvPr>
+            <p:ph type="title"/>
+          </p:nvPr>
+        </p:nvSpPr>
+        <p:spPr/>
+        <p:txBody>
+          <a:bodyPr/>
+          <a:lstStyle/>
+          <a:p>
+            <a:r>
+              <a:rPr lang="en-US" dirty="0"/>
+              <a:t>Dynamic rendering</a:t>
+            </a:r>
+          </a:p>
+        </p:txBody>
+      </p:sp>
+      <p:pic>
+        <p:nvPicPr>
+          <p:cNvPr id="4" name="Picture 3">
+            <a:extLst>
+              <a:ext uri="{FF2B5EF4-FFF2-40B4-BE49-F238E27FC236}">
+                <a16:creationId xmlns:a16="http://schemas.microsoft.com/office/drawing/2014/main" id="{595F6D0F-3893-8071-8883-984598E87DCE}"/>
+              </a:ext>
+            </a:extLst>
+          </p:cNvPr>
+          <p:cNvPicPr>
+            <a:picLocks noChangeAspect="1"/>
+          </p:cNvPicPr>
+          <p:nvPr/>
+        </p:nvPicPr>
+        <p:blipFill>
+          <a:blip r:embed="rId2">
+            <a:duotone>
+              <a:prstClr val="black"/>
+              <a:schemeClr val="accent1">
+                <a:tint val="45000"/>
+                <a:satMod val="400000"/>
+              </a:schemeClr>
+            </a:duotone>
+            <a:extLst>
+              <a:ext uri="{28A0092B-C50C-407E-A947-70E740481C1C}">
+                <a14:useLocalDpi xmlns:a14="http://schemas.microsoft.com/office/drawing/2010/main" val="0"/>
+              </a:ext>
+            </a:extLst>
+          </a:blip>
+          <a:stretch>
+            <a:fillRect/>
+          </a:stretch>
+        </p:blipFill>
+        <p:spPr>
+          <a:xfrm>
+            <a:off x="393574" y="2137078"/>
+            <a:ext cx="6362333" cy="3608636"/>
+          </a:xfrm>
+          <a:prstGeom prst="rect">
+            <a:avLst/>
+          </a:prstGeom>
+        </p:spPr>
+      </p:pic>
+      <p:sp>
+        <p:nvSpPr>
+          <p:cNvPr id="9" name="Arrow: Right 8">
+            <a:extLst>
+              <a:ext uri="{FF2B5EF4-FFF2-40B4-BE49-F238E27FC236}">
+                <a16:creationId xmlns:a16="http://schemas.microsoft.com/office/drawing/2014/main" id="{E8FB1213-A862-E530-1394-5AB3819FBAFD}"/>
+              </a:ext>
+            </a:extLst>
+          </p:cNvPr>
+          <p:cNvSpPr/>
+          <p:nvPr/>
+        </p:nvSpPr>
+        <p:spPr>
+          <a:xfrm>
+            <a:off x="7306322" y="3701699"/>
+            <a:ext cx="816745" cy="479394"/>
+          </a:xfrm>
+          <a:prstGeom prst="rightArrow">
+            <a:avLst/>
+          </a:prstGeom>
+        </p:spPr>
+        <p:style>
+          <a:lnRef idx="2">
+            <a:schemeClr val="dk1">
+              <a:shade val="50000"/>
+            </a:schemeClr>
+          </a:lnRef>
+          <a:fillRef idx="1">
+            <a:schemeClr val="dk1"/>
+          </a:fillRef>
+          <a:effectRef idx="0">
+            <a:schemeClr val="dk1"/>
+          </a:effectRef>
+          <a:fontRef idx="minor">
+            <a:schemeClr val="lt1"/>
+          </a:fontRef>
+        </p:style>
+        <p:txBody>
+          <a:bodyPr rtlCol="0" anchor="ctr"/>
+          <a:lstStyle/>
+          <a:p>
+            <a:pPr algn="ctr"/>
+            <a:endParaRPr lang="en-US"/>
+          </a:p>
+        </p:txBody>
+      </p:sp>
+      <p:sp>
+        <p:nvSpPr>
+          <p:cNvPr id="10" name="Rectangle 9">
+            <a:extLst>
+              <a:ext uri="{FF2B5EF4-FFF2-40B4-BE49-F238E27FC236}">
+                <a16:creationId xmlns:a16="http://schemas.microsoft.com/office/drawing/2014/main" id="{01310AB2-94EB-5A51-7685-4F8A24565DAC}"/>
+              </a:ext>
+            </a:extLst>
+          </p:cNvPr>
+          <p:cNvSpPr/>
+          <p:nvPr/>
+        </p:nvSpPr>
+        <p:spPr>
+          <a:xfrm>
+            <a:off x="8438748" y="3128452"/>
+            <a:ext cx="1855434" cy="1619521"/>
+          </a:xfrm>
+          <a:prstGeom prst="rect">
+            <a:avLst/>
+          </a:prstGeom>
+        </p:spPr>
+        <p:style>
+          <a:lnRef idx="2">
+            <a:schemeClr val="accent1">
+              <a:shade val="50000"/>
+            </a:schemeClr>
+          </a:lnRef>
+          <a:fillRef idx="1">
+            <a:schemeClr val="accent1"/>
+          </a:fillRef>
+          <a:effectRef idx="0">
+            <a:schemeClr val="accent1"/>
+          </a:effectRef>
+          <a:fontRef idx="minor">
+            <a:schemeClr val="lt1"/>
+          </a:fontRef>
+        </p:style>
+        <p:txBody>
+          <a:bodyPr rtlCol="0" anchor="ctr"/>
+          <a:lstStyle/>
+          <a:p>
+            <a:pPr algn="ctr"/>
+            <a:r>
+              <a:rPr lang="en-US" dirty="0"/>
+              <a:t>Like </a:t>
+            </a:r>
+            <a:r>
+              <a:rPr lang="en-US" dirty="0" err="1"/>
+              <a:t>digikala</a:t>
+            </a:r>
+            <a:endParaRPr lang="en-US" dirty="0"/>
+          </a:p>
+        </p:txBody>
+      </p:sp>
+      <p:sp>
+        <p:nvSpPr>
+          <p:cNvPr id="11" name="Oval 10">
+            <a:extLst>
+              <a:ext uri="{FF2B5EF4-FFF2-40B4-BE49-F238E27FC236}">
+                <a16:creationId xmlns:a16="http://schemas.microsoft.com/office/drawing/2014/main" id="{E1E1DC4C-1F5E-0C6A-7AD9-ED31FC149668}"/>
+              </a:ext>
+            </a:extLst>
+          </p:cNvPr>
+          <p:cNvSpPr/>
+          <p:nvPr/>
+        </p:nvSpPr>
+        <p:spPr>
+          <a:xfrm>
+            <a:off x="7102137" y="5023835"/>
+            <a:ext cx="1855433" cy="1619521"/>
+          </a:xfrm>
+          <a:prstGeom prst="ellipse">
+            <a:avLst/>
+          </a:prstGeom>
+        </p:spPr>
+        <p:style>
+          <a:lnRef idx="2">
+            <a:schemeClr val="accent1">
+              <a:shade val="50000"/>
+            </a:schemeClr>
+          </a:lnRef>
+          <a:fillRef idx="1">
+            <a:schemeClr val="accent1"/>
+          </a:fillRef>
+          <a:effectRef idx="0">
+            <a:schemeClr val="accent1"/>
+          </a:effectRef>
+          <a:fontRef idx="minor">
+            <a:schemeClr val="lt1"/>
+          </a:fontRef>
+        </p:style>
+        <p:txBody>
+          <a:bodyPr rtlCol="0" anchor="ctr"/>
+          <a:lstStyle/>
+          <a:p>
+            <a:pPr algn="ctr"/>
+            <a:r>
+              <a:rPr lang="en-US" sz="1200" dirty="0"/>
+              <a:t>if  google bot see this  app render by server side and </a:t>
+            </a:r>
+            <a:r>
+              <a:rPr lang="en-US" sz="1200" dirty="0" err="1"/>
+              <a:t>shw</a:t>
+            </a:r>
+            <a:r>
+              <a:rPr lang="en-US" sz="1200" dirty="0"/>
+              <a:t> link  and any thing … whit out </a:t>
+            </a:r>
+            <a:r>
+              <a:rPr lang="en-US" sz="1200" dirty="0" err="1"/>
+              <a:t>css</a:t>
+            </a:r>
+            <a:r>
+              <a:rPr lang="en-US" sz="1200" dirty="0"/>
+              <a:t> </a:t>
+            </a:r>
+          </a:p>
+        </p:txBody>
+      </p:sp>
+      <p:cxnSp>
+        <p:nvCxnSpPr>
+          <p:cNvPr id="15" name="Connector: Curved 14">
+            <a:extLst>
+              <a:ext uri="{FF2B5EF4-FFF2-40B4-BE49-F238E27FC236}">
+                <a16:creationId xmlns:a16="http://schemas.microsoft.com/office/drawing/2014/main" id="{25CC9080-2D49-5DBA-2014-155BD0C0C286}"/>
+              </a:ext>
+            </a:extLst>
+          </p:cNvPr>
+          <p:cNvCxnSpPr>
+            <a:cxnSpLocks/>
+          </p:cNvCxnSpPr>
+          <p:nvPr/>
+        </p:nvCxnSpPr>
+        <p:spPr>
+          <a:xfrm>
+            <a:off x="2009310" y="5294929"/>
+            <a:ext cx="1020935" cy="809842"/>
+          </a:xfrm>
+          <a:prstGeom prst="curvedConnector3">
+            <a:avLst>
+              <a:gd name="adj1" fmla="val 50000"/>
+            </a:avLst>
+          </a:prstGeom>
+          <a:ln>
+            <a:tailEnd type="triangle"/>
+          </a:ln>
+        </p:spPr>
+        <p:style>
+          <a:lnRef idx="1">
+            <a:schemeClr val="dk1"/>
+          </a:lnRef>
+          <a:fillRef idx="0">
+            <a:schemeClr val="dk1"/>
+          </a:fillRef>
+          <a:effectRef idx="0">
+            <a:schemeClr val="dk1"/>
+          </a:effectRef>
+          <a:fontRef idx="minor">
+            <a:schemeClr val="tx1"/>
+          </a:fontRef>
+        </p:style>
+      </p:cxnSp>
+      <p:sp>
+        <p:nvSpPr>
+          <p:cNvPr id="18" name="Oval 17">
+            <a:extLst>
+              <a:ext uri="{FF2B5EF4-FFF2-40B4-BE49-F238E27FC236}">
+                <a16:creationId xmlns:a16="http://schemas.microsoft.com/office/drawing/2014/main" id="{9FE50C24-F502-8202-CC76-B28419BDB361}"/>
+              </a:ext>
+            </a:extLst>
+          </p:cNvPr>
+          <p:cNvSpPr/>
+          <p:nvPr/>
+        </p:nvSpPr>
+        <p:spPr>
+          <a:xfrm>
+            <a:off x="3127898" y="5745714"/>
+            <a:ext cx="1426345" cy="1027948"/>
+          </a:xfrm>
+          <a:prstGeom prst="ellipse">
+            <a:avLst/>
+          </a:prstGeom>
+        </p:spPr>
+        <p:style>
+          <a:lnRef idx="2">
+            <a:schemeClr val="accent1">
+              <a:shade val="50000"/>
+            </a:schemeClr>
+          </a:lnRef>
+          <a:fillRef idx="1">
+            <a:schemeClr val="accent1"/>
+          </a:fillRef>
+          <a:effectRef idx="0">
+            <a:schemeClr val="accent1"/>
+          </a:effectRef>
+          <a:fontRef idx="minor">
+            <a:schemeClr val="lt1"/>
+          </a:fontRef>
+        </p:style>
+        <p:txBody>
+          <a:bodyPr rtlCol="0" anchor="ctr"/>
+          <a:lstStyle/>
+          <a:p>
+            <a:pPr algn="ctr"/>
+            <a:r>
+              <a:rPr lang="en-US" sz="1200" dirty="0"/>
+              <a:t>If user see this  app show </a:t>
+            </a:r>
+            <a:r>
+              <a:rPr lang="en-US" sz="1200" dirty="0" err="1"/>
+              <a:t>orginal</a:t>
+            </a:r>
+            <a:r>
+              <a:rPr lang="en-US" sz="1200" dirty="0"/>
+              <a:t> app</a:t>
+            </a:r>
+          </a:p>
+        </p:txBody>
+      </p:sp>
+      <p:cxnSp>
+        <p:nvCxnSpPr>
+          <p:cNvPr id="22" name="Connector: Curved 21">
+            <a:extLst>
+              <a:ext uri="{FF2B5EF4-FFF2-40B4-BE49-F238E27FC236}">
+                <a16:creationId xmlns:a16="http://schemas.microsoft.com/office/drawing/2014/main" id="{AB8C16AE-BAB0-5D0B-3DBE-C0E86AA0B72A}"/>
+              </a:ext>
+            </a:extLst>
+          </p:cNvPr>
+          <p:cNvCxnSpPr/>
+          <p:nvPr/>
+        </p:nvCxnSpPr>
+        <p:spPr>
+          <a:xfrm>
+            <a:off x="5690586" y="5294929"/>
+            <a:ext cx="1269507" cy="741887"/>
+          </a:xfrm>
+          <a:prstGeom prst="curvedConnector3">
+            <a:avLst/>
+          </a:prstGeom>
+          <a:ln>
+            <a:tailEnd type="triangle"/>
+          </a:ln>
+        </p:spPr>
+        <p:style>
+          <a:lnRef idx="1">
+            <a:schemeClr val="dk1"/>
+          </a:lnRef>
+          <a:fillRef idx="0">
+            <a:schemeClr val="dk1"/>
+          </a:fillRef>
+          <a:effectRef idx="0">
+            <a:schemeClr val="dk1"/>
+          </a:effectRef>
+          <a:fontRef idx="minor">
+            <a:schemeClr val="tx1"/>
+          </a:fontRef>
+        </p:style>
+      </p:cxnSp>
+    </p:spTree>
+    <p:extLst>
+      <p:ext uri="{BB962C8B-B14F-4D97-AF65-F5344CB8AC3E}">
+        <p14:creationId xmlns:p14="http://schemas.microsoft.com/office/powerpoint/2010/main" val="2796725413"/>
+      </p:ext>
+    </p:extLst>
+  </p:cSld>
+  <p:clrMapOvr>
+    <a:masterClrMapping/>
+  </p:clrMapOvr>
+  <p:timing>
+    <p:tnLst>
+      <p:par>
+        <p:cTn id="1" dur="indefinite" restart="never" nodeType="tmRoot">
+          <p:childTnLst>
+            <p:seq concurrent="1" nextAc="seek">
+              <p:cTn id="2" dur="indefinite" nodeType="mainSeq">
+                <p:childTnLst>
+                  <p:par>
+                    <p:cTn id="3" fill="hold">
+                      <p:stCondLst>
+                        <p:cond delay="indefinite"/>
+                      </p:stCondLst>
+                      <p:childTnLst>
+                        <p:par>
+                          <p:cTn id="4" fill="hold">
+                            <p:stCondLst>
+                              <p:cond delay="0"/>
+                            </p:stCondLst>
+                            <p:childTnLst>
+                              <p:par>
+                                <p:cTn id="5" presetID="10" presetClass="entr" presetSubtype="0" fill="hold" nodeType="clickEffect">
+                                  <p:stCondLst>
+                                    <p:cond delay="0"/>
+                                  </p:stCondLst>
+                                  <p:childTnLst>
+                                    <p:set>
+                                      <p:cBhvr>
+                                        <p:cTn id="6" dur="1" fill="hold">
+                                          <p:stCondLst>
+                                            <p:cond delay="0"/>
+                                          </p:stCondLst>
+                                        </p:cTn>
+                                        <p:tgtEl>
+                                          <p:spTgt spid="4"/>
+                                        </p:tgtEl>
+                                        <p:attrNameLst>
+                                          <p:attrName>style.visibility</p:attrName>
+                                        </p:attrNameLst>
+                                      </p:cBhvr>
+                                      <p:to>
+                                        <p:strVal val="visible"/>
+                                      </p:to>
+                                    </p:set>
+                                    <p:animEffect transition="in" filter="fade">
+                                      <p:cBhvr>
+                                        <p:cTn id="7" dur="500"/>
+                                        <p:tgtEl>
+                                          <p:spTgt spid="4"/>
+                                        </p:tgtEl>
+                                      </p:cBhvr>
+                                    </p:animEffect>
+                                  </p:childTnLst>
+                                </p:cTn>
+                              </p:par>
+                            </p:childTnLst>
+                          </p:cTn>
+                        </p:par>
+                      </p:childTnLst>
+                    </p:cTn>
+                  </p:par>
+                  <p:par>
+                    <p:cTn id="8" fill="hold">
+                      <p:stCondLst>
+                        <p:cond delay="indefinite"/>
+                      </p:stCondLst>
+                      <p:childTnLst>
+                        <p:par>
+                          <p:cTn id="9" fill="hold">
+                            <p:stCondLst>
+                              <p:cond delay="0"/>
+                            </p:stCondLst>
+                            <p:childTnLst>
+                              <p:par>
+                                <p:cTn id="10" presetID="10" presetClass="entr" presetSubtype="0" fill="hold" grpId="0" nodeType="clickEffect">
+                                  <p:stCondLst>
+                                    <p:cond delay="0"/>
+                                  </p:stCondLst>
+                                  <p:childTnLst>
+                                    <p:set>
+                                      <p:cBhvr>
+                                        <p:cTn id="11" dur="1" fill="hold">
+                                          <p:stCondLst>
+                                            <p:cond delay="0"/>
+                                          </p:stCondLst>
+                                        </p:cTn>
+                                        <p:tgtEl>
+                                          <p:spTgt spid="9"/>
+                                        </p:tgtEl>
+                                        <p:attrNameLst>
+                                          <p:attrName>style.visibility</p:attrName>
+                                        </p:attrNameLst>
+                                      </p:cBhvr>
+                                      <p:to>
+                                        <p:strVal val="visible"/>
+                                      </p:to>
+                                    </p:set>
+                                    <p:animEffect transition="in" filter="fade">
+                                      <p:cBhvr>
+                                        <p:cTn id="12" dur="500"/>
+                                        <p:tgtEl>
+                                          <p:spTgt spid="9"/>
+                                        </p:tgtEl>
+                                      </p:cBhvr>
+                                    </p:animEffect>
+                                  </p:childTnLst>
+                                </p:cTn>
+                              </p:par>
+                            </p:childTnLst>
+                          </p:cTn>
+                        </p:par>
+                      </p:childTnLst>
+                    </p:cTn>
+                  </p:par>
+                  <p:par>
+                    <p:cTn id="13" fill="hold">
+                      <p:stCondLst>
+                        <p:cond delay="indefinite"/>
+                      </p:stCondLst>
+                      <p:childTnLst>
+                        <p:par>
+                          <p:cTn id="14" fill="hold">
+                            <p:stCondLst>
+                              <p:cond delay="0"/>
+                            </p:stCondLst>
+                            <p:childTnLst>
+                              <p:par>
+                                <p:cTn id="15" presetID="10" presetClass="entr" presetSubtype="0" fill="hold" grpId="0" nodeType="clickEffect">
+                                  <p:stCondLst>
+                                    <p:cond delay="0"/>
+                                  </p:stCondLst>
+                                  <p:childTnLst>
+                                    <p:set>
+                                      <p:cBhvr>
+                                        <p:cTn id="16" dur="1" fill="hold">
+                                          <p:stCondLst>
+                                            <p:cond delay="0"/>
+                                          </p:stCondLst>
+                                        </p:cTn>
+                                        <p:tgtEl>
+                                          <p:spTgt spid="10"/>
+                                        </p:tgtEl>
+                                        <p:attrNameLst>
+                                          <p:attrName>style.visibility</p:attrName>
+                                        </p:attrNameLst>
+                                      </p:cBhvr>
+                                      <p:to>
+                                        <p:strVal val="visible"/>
+                                      </p:to>
+                                    </p:set>
+                                    <p:animEffect transition="in" filter="fade">
+                                      <p:cBhvr>
+                                        <p:cTn id="17" dur="500"/>
+                                        <p:tgtEl>
+                                          <p:spTgt spid="10"/>
+                                        </p:tgtEl>
+                                      </p:cBhvr>
+                                    </p:animEffect>
+                                  </p:childTnLst>
+                                </p:cTn>
+                              </p:par>
+                            </p:childTnLst>
+                          </p:cTn>
+                        </p:par>
+                      </p:childTnLst>
+                    </p:cTn>
+                  </p:par>
+                  <p:par>
+                    <p:cTn id="18" fill="hold">
+                      <p:stCondLst>
+                        <p:cond delay="indefinite"/>
+                      </p:stCondLst>
+                      <p:childTnLst>
+                        <p:par>
+                          <p:cTn id="19" fill="hold">
+                            <p:stCondLst>
+                              <p:cond delay="0"/>
+                            </p:stCondLst>
+                            <p:childTnLst>
+                              <p:par>
+                                <p:cTn id="20" presetID="10" presetClass="entr" presetSubtype="0" fill="hold" nodeType="clickEffect">
+                                  <p:stCondLst>
+                                    <p:cond delay="0"/>
+                                  </p:stCondLst>
+                                  <p:childTnLst>
+                                    <p:set>
+                                      <p:cBhvr>
+                                        <p:cTn id="21" dur="1" fill="hold">
+                                          <p:stCondLst>
+                                            <p:cond delay="0"/>
+                                          </p:stCondLst>
+                                        </p:cTn>
+                                        <p:tgtEl>
+                                          <p:spTgt spid="22"/>
+                                        </p:tgtEl>
+                                        <p:attrNameLst>
+                                          <p:attrName>style.visibility</p:attrName>
+                                        </p:attrNameLst>
+                                      </p:cBhvr>
+                                      <p:to>
+                                        <p:strVal val="visible"/>
+                                      </p:to>
+                                    </p:set>
+                                    <p:animEffect transition="in" filter="fade">
+                                      <p:cBhvr>
+                                        <p:cTn id="22" dur="500"/>
+                                        <p:tgtEl>
+                                          <p:spTgt spid="22"/>
+                                        </p:tgtEl>
+                                      </p:cBhvr>
+                                    </p:animEffect>
+                                  </p:childTnLst>
+                                </p:cTn>
+                              </p:par>
+                            </p:childTnLst>
+                          </p:cTn>
+                        </p:par>
+                      </p:childTnLst>
+                    </p:cTn>
+                  </p:par>
+                  <p:par>
+                    <p:cTn id="23" fill="hold">
+                      <p:stCondLst>
+                        <p:cond delay="indefinite"/>
+                      </p:stCondLst>
+                      <p:childTnLst>
+                        <p:par>
+                          <p:cTn id="24" fill="hold">
+                            <p:stCondLst>
+                              <p:cond delay="0"/>
+                            </p:stCondLst>
+                            <p:childTnLst>
+                              <p:par>
+                                <p:cTn id="25" presetID="10" presetClass="entr" presetSubtype="0" fill="hold" grpId="0" nodeType="clickEffect">
+                                  <p:stCondLst>
+                                    <p:cond delay="0"/>
+                                  </p:stCondLst>
+                                  <p:childTnLst>
+                                    <p:set>
+                                      <p:cBhvr>
+                                        <p:cTn id="26" dur="1" fill="hold">
+                                          <p:stCondLst>
+                                            <p:cond delay="0"/>
+                                          </p:stCondLst>
+                                        </p:cTn>
+                                        <p:tgtEl>
+                                          <p:spTgt spid="11"/>
+                                        </p:tgtEl>
+                                        <p:attrNameLst>
+                                          <p:attrName>style.visibility</p:attrName>
+                                        </p:attrNameLst>
+                                      </p:cBhvr>
+                                      <p:to>
+                                        <p:strVal val="visible"/>
+                                      </p:to>
+                                    </p:set>
+                                    <p:animEffect transition="in" filter="fade">
+                                      <p:cBhvr>
+                                        <p:cTn id="27" dur="500"/>
+                                        <p:tgtEl>
+                                          <p:spTgt spid="11"/>
+                                        </p:tgtEl>
+                                      </p:cBhvr>
+                                    </p:animEffect>
+                                  </p:childTnLst>
+                                </p:cTn>
+                              </p:par>
+                            </p:childTnLst>
+                          </p:cTn>
+                        </p:par>
+                      </p:childTnLst>
+                    </p:cTn>
+                  </p:par>
+                  <p:par>
+                    <p:cTn id="28" fill="hold">
+                      <p:stCondLst>
+                        <p:cond delay="indefinite"/>
+                      </p:stCondLst>
+                      <p:childTnLst>
+                        <p:par>
+                          <p:cTn id="29" fill="hold">
+                            <p:stCondLst>
+                              <p:cond delay="0"/>
+                            </p:stCondLst>
+                            <p:childTnLst>
+                              <p:par>
+                                <p:cTn id="30" presetID="10" presetClass="entr" presetSubtype="0" fill="hold" nodeType="clickEffect">
+                                  <p:stCondLst>
+                                    <p:cond delay="0"/>
+                                  </p:stCondLst>
+                                  <p:childTnLst>
+                                    <p:set>
+                                      <p:cBhvr>
+                                        <p:cTn id="31" dur="1" fill="hold">
+                                          <p:stCondLst>
+                                            <p:cond delay="0"/>
+                                          </p:stCondLst>
+                                        </p:cTn>
+                                        <p:tgtEl>
+                                          <p:spTgt spid="15"/>
+                                        </p:tgtEl>
+                                        <p:attrNameLst>
+                                          <p:attrName>style.visibility</p:attrName>
+                                        </p:attrNameLst>
+                                      </p:cBhvr>
+                                      <p:to>
+                                        <p:strVal val="visible"/>
+                                      </p:to>
+                                    </p:set>
+                                    <p:animEffect transition="in" filter="fade">
+                                      <p:cBhvr>
+                                        <p:cTn id="32" dur="500"/>
+                                        <p:tgtEl>
+                                          <p:spTgt spid="15"/>
+                                        </p:tgtEl>
+                                      </p:cBhvr>
+                                    </p:animEffect>
+                                  </p:childTnLst>
+                                </p:cTn>
+                              </p:par>
+                            </p:childTnLst>
+                          </p:cTn>
+                        </p:par>
+                      </p:childTnLst>
+                    </p:cTn>
+                  </p:par>
+                  <p:par>
+                    <p:cTn id="33" fill="hold">
+                      <p:stCondLst>
+                        <p:cond delay="indefinite"/>
+                      </p:stCondLst>
+                      <p:childTnLst>
+                        <p:par>
+                          <p:cTn id="34" fill="hold">
+                            <p:stCondLst>
+                              <p:cond delay="0"/>
+                            </p:stCondLst>
+                            <p:childTnLst>
+                              <p:par>
+                                <p:cTn id="35" presetID="10" presetClass="entr" presetSubtype="0" fill="hold" grpId="0" nodeType="clickEffect">
+                                  <p:stCondLst>
+                                    <p:cond delay="0"/>
+                                  </p:stCondLst>
+                                  <p:childTnLst>
+                                    <p:set>
+                                      <p:cBhvr>
+                                        <p:cTn id="36" dur="1" fill="hold">
+                                          <p:stCondLst>
+                                            <p:cond delay="0"/>
+                                          </p:stCondLst>
+                                        </p:cTn>
+                                        <p:tgtEl>
+                                          <p:spTgt spid="18"/>
+                                        </p:tgtEl>
+                                        <p:attrNameLst>
+                                          <p:attrName>style.visibility</p:attrName>
+                                        </p:attrNameLst>
+                                      </p:cBhvr>
+                                      <p:to>
+                                        <p:strVal val="visible"/>
+                                      </p:to>
+                                    </p:set>
+                                    <p:animEffect transition="in" filter="fade">
+                                      <p:cBhvr>
+                                        <p:cTn id="37" dur="500"/>
+                                        <p:tgtEl>
+                                          <p:spTgt spid="18"/>
+                                        </p:tgtEl>
+                                      </p:cBhvr>
+                                    </p:animEffect>
+                                  </p:childTnLst>
+                                </p:cTn>
+                              </p:par>
+                            </p:childTnLst>
+                          </p:cTn>
+                        </p:par>
+                      </p:childTnLst>
+                    </p:cTn>
+                  </p:par>
+                </p:childTnLst>
+              </p:cTn>
+              <p:prevCondLst>
+                <p:cond evt="onPrev" delay="0">
+                  <p:tgtEl>
+                    <p:sldTgt/>
+                  </p:tgtEl>
+                </p:cond>
+              </p:prevCondLst>
+              <p:nextCondLst>
+                <p:cond evt="onNext" delay="0">
+                  <p:tgtEl>
+                    <p:sldTgt/>
+                  </p:tgtEl>
+                </p:cond>
+              </p:nextCondLst>
+            </p:seq>
+          </p:childTnLst>
+        </p:cTn>
+      </p:par>
+    </p:tnLst>
+    <p:bldLst>
+      <p:bldP spid="9" grpId="0" animBg="1"/>
+      <p:bldP spid="10" grpId="0" animBg="1"/>
+      <p:bldP spid="11" grpId="0" animBg="1"/>
+      <p:bldP spid="18" grpId="0" animBg="1"/>
+    </p:bldLst>
+  </p:timing>
 </p:sld>
 </file>
 
@@ -10174,6 +12498,308 @@
   <p:clrMapOvr>
     <a:masterClrMapping/>
   </p:clrMapOvr>
+  <p:timing>
+    <p:tnLst>
+      <p:par>
+        <p:cTn id="1" dur="indefinite" restart="never" nodeType="tmRoot">
+          <p:childTnLst>
+            <p:seq concurrent="1" nextAc="seek">
+              <p:cTn id="2" dur="indefinite" nodeType="mainSeq">
+                <p:childTnLst>
+                  <p:par>
+                    <p:cTn id="3" fill="hold">
+                      <p:stCondLst>
+                        <p:cond delay="indefinite"/>
+                      </p:stCondLst>
+                      <p:childTnLst>
+                        <p:par>
+                          <p:cTn id="4" fill="hold">
+                            <p:stCondLst>
+                              <p:cond delay="0"/>
+                            </p:stCondLst>
+                            <p:childTnLst>
+                              <p:par>
+                                <p:cTn id="5" presetID="10" presetClass="entr" presetSubtype="0" fill="hold" grpId="0" nodeType="clickEffect">
+                                  <p:stCondLst>
+                                    <p:cond delay="0"/>
+                                  </p:stCondLst>
+                                  <p:childTnLst>
+                                    <p:set>
+                                      <p:cBhvr>
+                                        <p:cTn id="6" dur="1" fill="hold">
+                                          <p:stCondLst>
+                                            <p:cond delay="0"/>
+                                          </p:stCondLst>
+                                        </p:cTn>
+                                        <p:tgtEl>
+                                          <p:spTgt spid="4"/>
+                                        </p:tgtEl>
+                                        <p:attrNameLst>
+                                          <p:attrName>style.visibility</p:attrName>
+                                        </p:attrNameLst>
+                                      </p:cBhvr>
+                                      <p:to>
+                                        <p:strVal val="visible"/>
+                                      </p:to>
+                                    </p:set>
+                                    <p:animEffect transition="in" filter="fade">
+                                      <p:cBhvr>
+                                        <p:cTn id="7" dur="500"/>
+                                        <p:tgtEl>
+                                          <p:spTgt spid="4"/>
+                                        </p:tgtEl>
+                                      </p:cBhvr>
+                                    </p:animEffect>
+                                  </p:childTnLst>
+                                </p:cTn>
+                              </p:par>
+                            </p:childTnLst>
+                          </p:cTn>
+                        </p:par>
+                      </p:childTnLst>
+                    </p:cTn>
+                  </p:par>
+                  <p:par>
+                    <p:cTn id="8" fill="hold">
+                      <p:stCondLst>
+                        <p:cond delay="indefinite"/>
+                      </p:stCondLst>
+                      <p:childTnLst>
+                        <p:par>
+                          <p:cTn id="9" fill="hold">
+                            <p:stCondLst>
+                              <p:cond delay="0"/>
+                            </p:stCondLst>
+                            <p:childTnLst>
+                              <p:par>
+                                <p:cTn id="10" presetID="10" presetClass="entr" presetSubtype="0" fill="hold" grpId="0" nodeType="clickEffect">
+                                  <p:stCondLst>
+                                    <p:cond delay="0"/>
+                                  </p:stCondLst>
+                                  <p:childTnLst>
+                                    <p:set>
+                                      <p:cBhvr>
+                                        <p:cTn id="11" dur="1" fill="hold">
+                                          <p:stCondLst>
+                                            <p:cond delay="0"/>
+                                          </p:stCondLst>
+                                        </p:cTn>
+                                        <p:tgtEl>
+                                          <p:spTgt spid="6"/>
+                                        </p:tgtEl>
+                                        <p:attrNameLst>
+                                          <p:attrName>style.visibility</p:attrName>
+                                        </p:attrNameLst>
+                                      </p:cBhvr>
+                                      <p:to>
+                                        <p:strVal val="visible"/>
+                                      </p:to>
+                                    </p:set>
+                                    <p:animEffect transition="in" filter="fade">
+                                      <p:cBhvr>
+                                        <p:cTn id="12" dur="500"/>
+                                        <p:tgtEl>
+                                          <p:spTgt spid="6"/>
+                                        </p:tgtEl>
+                                      </p:cBhvr>
+                                    </p:animEffect>
+                                  </p:childTnLst>
+                                </p:cTn>
+                              </p:par>
+                            </p:childTnLst>
+                          </p:cTn>
+                        </p:par>
+                      </p:childTnLst>
+                    </p:cTn>
+                  </p:par>
+                  <p:par>
+                    <p:cTn id="13" fill="hold">
+                      <p:stCondLst>
+                        <p:cond delay="indefinite"/>
+                      </p:stCondLst>
+                      <p:childTnLst>
+                        <p:par>
+                          <p:cTn id="14" fill="hold">
+                            <p:stCondLst>
+                              <p:cond delay="0"/>
+                            </p:stCondLst>
+                            <p:childTnLst>
+                              <p:par>
+                                <p:cTn id="15" presetID="10" presetClass="entr" presetSubtype="0" fill="hold" grpId="0" nodeType="clickEffect">
+                                  <p:stCondLst>
+                                    <p:cond delay="0"/>
+                                  </p:stCondLst>
+                                  <p:childTnLst>
+                                    <p:set>
+                                      <p:cBhvr>
+                                        <p:cTn id="16" dur="1" fill="hold">
+                                          <p:stCondLst>
+                                            <p:cond delay="0"/>
+                                          </p:stCondLst>
+                                        </p:cTn>
+                                        <p:tgtEl>
+                                          <p:spTgt spid="8"/>
+                                        </p:tgtEl>
+                                        <p:attrNameLst>
+                                          <p:attrName>style.visibility</p:attrName>
+                                        </p:attrNameLst>
+                                      </p:cBhvr>
+                                      <p:to>
+                                        <p:strVal val="visible"/>
+                                      </p:to>
+                                    </p:set>
+                                    <p:animEffect transition="in" filter="fade">
+                                      <p:cBhvr>
+                                        <p:cTn id="17" dur="500"/>
+                                        <p:tgtEl>
+                                          <p:spTgt spid="8"/>
+                                        </p:tgtEl>
+                                      </p:cBhvr>
+                                    </p:animEffect>
+                                  </p:childTnLst>
+                                </p:cTn>
+                              </p:par>
+                            </p:childTnLst>
+                          </p:cTn>
+                        </p:par>
+                      </p:childTnLst>
+                    </p:cTn>
+                  </p:par>
+                  <p:par>
+                    <p:cTn id="18" fill="hold">
+                      <p:stCondLst>
+                        <p:cond delay="indefinite"/>
+                      </p:stCondLst>
+                      <p:childTnLst>
+                        <p:par>
+                          <p:cTn id="19" fill="hold">
+                            <p:stCondLst>
+                              <p:cond delay="0"/>
+                            </p:stCondLst>
+                            <p:childTnLst>
+                              <p:par>
+                                <p:cTn id="20" presetID="10" presetClass="entr" presetSubtype="0" fill="hold" grpId="0" nodeType="clickEffect">
+                                  <p:stCondLst>
+                                    <p:cond delay="0"/>
+                                  </p:stCondLst>
+                                  <p:childTnLst>
+                                    <p:set>
+                                      <p:cBhvr>
+                                        <p:cTn id="21" dur="1" fill="hold">
+                                          <p:stCondLst>
+                                            <p:cond delay="0"/>
+                                          </p:stCondLst>
+                                        </p:cTn>
+                                        <p:tgtEl>
+                                          <p:spTgt spid="7"/>
+                                        </p:tgtEl>
+                                        <p:attrNameLst>
+                                          <p:attrName>style.visibility</p:attrName>
+                                        </p:attrNameLst>
+                                      </p:cBhvr>
+                                      <p:to>
+                                        <p:strVal val="visible"/>
+                                      </p:to>
+                                    </p:set>
+                                    <p:animEffect transition="in" filter="fade">
+                                      <p:cBhvr>
+                                        <p:cTn id="22" dur="500"/>
+                                        <p:tgtEl>
+                                          <p:spTgt spid="7"/>
+                                        </p:tgtEl>
+                                      </p:cBhvr>
+                                    </p:animEffect>
+                                  </p:childTnLst>
+                                </p:cTn>
+                              </p:par>
+                            </p:childTnLst>
+                          </p:cTn>
+                        </p:par>
+                      </p:childTnLst>
+                    </p:cTn>
+                  </p:par>
+                  <p:par>
+                    <p:cTn id="23" fill="hold">
+                      <p:stCondLst>
+                        <p:cond delay="indefinite"/>
+                      </p:stCondLst>
+                      <p:childTnLst>
+                        <p:par>
+                          <p:cTn id="24" fill="hold">
+                            <p:stCondLst>
+                              <p:cond delay="0"/>
+                            </p:stCondLst>
+                            <p:childTnLst>
+                              <p:par>
+                                <p:cTn id="25" presetID="10" presetClass="entr" presetSubtype="0" fill="hold" grpId="0" nodeType="clickEffect">
+                                  <p:stCondLst>
+                                    <p:cond delay="0"/>
+                                  </p:stCondLst>
+                                  <p:childTnLst>
+                                    <p:set>
+                                      <p:cBhvr>
+                                        <p:cTn id="26" dur="1" fill="hold">
+                                          <p:stCondLst>
+                                            <p:cond delay="0"/>
+                                          </p:stCondLst>
+                                        </p:cTn>
+                                        <p:tgtEl>
+                                          <p:spTgt spid="9"/>
+                                        </p:tgtEl>
+                                        <p:attrNameLst>
+                                          <p:attrName>style.visibility</p:attrName>
+                                        </p:attrNameLst>
+                                      </p:cBhvr>
+                                      <p:to>
+                                        <p:strVal val="visible"/>
+                                      </p:to>
+                                    </p:set>
+                                    <p:animEffect transition="in" filter="fade">
+                                      <p:cBhvr>
+                                        <p:cTn id="27" dur="500"/>
+                                        <p:tgtEl>
+                                          <p:spTgt spid="9"/>
+                                        </p:tgtEl>
+                                      </p:cBhvr>
+                                    </p:animEffect>
+                                  </p:childTnLst>
+                                </p:cTn>
+                              </p:par>
+                            </p:childTnLst>
+                          </p:cTn>
+                        </p:par>
+                      </p:childTnLst>
+                    </p:cTn>
+                  </p:par>
+                </p:childTnLst>
+              </p:cTn>
+              <p:prevCondLst>
+                <p:cond evt="onPrev" delay="0">
+                  <p:tgtEl>
+                    <p:sldTgt/>
+                  </p:tgtEl>
+                </p:cond>
+              </p:prevCondLst>
+              <p:nextCondLst>
+                <p:cond evt="onNext" delay="0">
+                  <p:tgtEl>
+                    <p:sldTgt/>
+                  </p:tgtEl>
+                </p:cond>
+              </p:nextCondLst>
+            </p:seq>
+          </p:childTnLst>
+        </p:cTn>
+      </p:par>
+    </p:tnLst>
+    <p:bldLst>
+      <p:bldP spid="4" grpId="0" animBg="1"/>
+      <p:bldP spid="6" grpId="0"/>
+      <p:bldP spid="7" grpId="0" animBg="1"/>
+      <p:bldP spid="8" grpId="0"/>
+      <p:bldP spid="9" grpId="0"/>
+    </p:bldLst>
+  </p:timing>
 </p:sld>
 </file>
 
@@ -10517,6 +13143,200 @@
   <p:clrMapOvr>
     <a:masterClrMapping/>
   </p:clrMapOvr>
+  <p:timing>
+    <p:tnLst>
+      <p:par>
+        <p:cTn id="1" dur="indefinite" restart="never" nodeType="tmRoot">
+          <p:childTnLst>
+            <p:seq concurrent="1" nextAc="seek">
+              <p:cTn id="2" dur="indefinite" nodeType="mainSeq">
+                <p:childTnLst>
+                  <p:par>
+                    <p:cTn id="3" fill="hold">
+                      <p:stCondLst>
+                        <p:cond delay="indefinite"/>
+                      </p:stCondLst>
+                      <p:childTnLst>
+                        <p:par>
+                          <p:cTn id="4" fill="hold">
+                            <p:stCondLst>
+                              <p:cond delay="0"/>
+                            </p:stCondLst>
+                            <p:childTnLst>
+                              <p:par>
+                                <p:cTn id="5" presetID="10" presetClass="entr" presetSubtype="0" fill="hold" grpId="0" nodeType="clickEffect">
+                                  <p:stCondLst>
+                                    <p:cond delay="0"/>
+                                  </p:stCondLst>
+                                  <p:childTnLst>
+                                    <p:set>
+                                      <p:cBhvr>
+                                        <p:cTn id="6" dur="1" fill="hold">
+                                          <p:stCondLst>
+                                            <p:cond delay="0"/>
+                                          </p:stCondLst>
+                                        </p:cTn>
+                                        <p:tgtEl>
+                                          <p:spTgt spid="3"/>
+                                        </p:tgtEl>
+                                        <p:attrNameLst>
+                                          <p:attrName>style.visibility</p:attrName>
+                                        </p:attrNameLst>
+                                      </p:cBhvr>
+                                      <p:to>
+                                        <p:strVal val="visible"/>
+                                      </p:to>
+                                    </p:set>
+                                    <p:animEffect transition="in" filter="fade">
+                                      <p:cBhvr>
+                                        <p:cTn id="7" dur="500"/>
+                                        <p:tgtEl>
+                                          <p:spTgt spid="3"/>
+                                        </p:tgtEl>
+                                      </p:cBhvr>
+                                    </p:animEffect>
+                                  </p:childTnLst>
+                                </p:cTn>
+                              </p:par>
+                            </p:childTnLst>
+                          </p:cTn>
+                        </p:par>
+                      </p:childTnLst>
+                    </p:cTn>
+                  </p:par>
+                  <p:par>
+                    <p:cTn id="8" fill="hold">
+                      <p:stCondLst>
+                        <p:cond delay="indefinite"/>
+                      </p:stCondLst>
+                      <p:childTnLst>
+                        <p:par>
+                          <p:cTn id="9" fill="hold">
+                            <p:stCondLst>
+                              <p:cond delay="0"/>
+                            </p:stCondLst>
+                            <p:childTnLst>
+                              <p:par>
+                                <p:cTn id="10" presetID="10" presetClass="entr" presetSubtype="0" fill="hold" grpId="0" nodeType="clickEffect">
+                                  <p:stCondLst>
+                                    <p:cond delay="0"/>
+                                  </p:stCondLst>
+                                  <p:childTnLst>
+                                    <p:set>
+                                      <p:cBhvr>
+                                        <p:cTn id="11" dur="1" fill="hold">
+                                          <p:stCondLst>
+                                            <p:cond delay="0"/>
+                                          </p:stCondLst>
+                                        </p:cTn>
+                                        <p:tgtEl>
+                                          <p:spTgt spid="4"/>
+                                        </p:tgtEl>
+                                        <p:attrNameLst>
+                                          <p:attrName>style.visibility</p:attrName>
+                                        </p:attrNameLst>
+                                      </p:cBhvr>
+                                      <p:to>
+                                        <p:strVal val="visible"/>
+                                      </p:to>
+                                    </p:set>
+                                    <p:animEffect transition="in" filter="fade">
+                                      <p:cBhvr>
+                                        <p:cTn id="12" dur="500"/>
+                                        <p:tgtEl>
+                                          <p:spTgt spid="4"/>
+                                        </p:tgtEl>
+                                      </p:cBhvr>
+                                    </p:animEffect>
+                                  </p:childTnLst>
+                                </p:cTn>
+                              </p:par>
+                            </p:childTnLst>
+                          </p:cTn>
+                        </p:par>
+                      </p:childTnLst>
+                    </p:cTn>
+                  </p:par>
+                  <p:par>
+                    <p:cTn id="13" fill="hold">
+                      <p:stCondLst>
+                        <p:cond delay="indefinite"/>
+                      </p:stCondLst>
+                      <p:childTnLst>
+                        <p:par>
+                          <p:cTn id="14" fill="hold">
+                            <p:stCondLst>
+                              <p:cond delay="0"/>
+                            </p:stCondLst>
+                            <p:childTnLst>
+                              <p:par>
+                                <p:cTn id="15" presetID="10" presetClass="entr" presetSubtype="0" fill="hold" grpId="0" nodeType="clickEffect">
+                                  <p:stCondLst>
+                                    <p:cond delay="0"/>
+                                  </p:stCondLst>
+                                  <p:childTnLst>
+                                    <p:set>
+                                      <p:cBhvr>
+                                        <p:cTn id="16" dur="1" fill="hold">
+                                          <p:stCondLst>
+                                            <p:cond delay="0"/>
+                                          </p:stCondLst>
+                                        </p:cTn>
+                                        <p:tgtEl>
+                                          <p:spTgt spid="5"/>
+                                        </p:tgtEl>
+                                        <p:attrNameLst>
+                                          <p:attrName>style.visibility</p:attrName>
+                                        </p:attrNameLst>
+                                      </p:cBhvr>
+                                      <p:to>
+                                        <p:strVal val="visible"/>
+                                      </p:to>
+                                    </p:set>
+                                    <p:animEffect transition="in" filter="fade">
+                                      <p:cBhvr>
+                                        <p:cTn id="17" dur="500"/>
+                                        <p:tgtEl>
+                                          <p:spTgt spid="5"/>
+                                        </p:tgtEl>
+                                      </p:cBhvr>
+                                    </p:animEffect>
+                                  </p:childTnLst>
+                                </p:cTn>
+                              </p:par>
+                            </p:childTnLst>
+                          </p:cTn>
+                        </p:par>
+                      </p:childTnLst>
+                    </p:cTn>
+                  </p:par>
+                </p:childTnLst>
+              </p:cTn>
+              <p:prevCondLst>
+                <p:cond evt="onPrev" delay="0">
+                  <p:tgtEl>
+                    <p:sldTgt/>
+                  </p:tgtEl>
+                </p:cond>
+              </p:prevCondLst>
+              <p:nextCondLst>
+                <p:cond evt="onNext" delay="0">
+                  <p:tgtEl>
+                    <p:sldTgt/>
+                  </p:tgtEl>
+                </p:cond>
+              </p:nextCondLst>
+            </p:seq>
+          </p:childTnLst>
+        </p:cTn>
+      </p:par>
+    </p:tnLst>
+    <p:bldLst>
+      <p:bldP spid="3" grpId="0"/>
+      <p:bldP spid="4" grpId="0" animBg="1"/>
+      <p:bldP spid="5" grpId="0"/>
+    </p:bldLst>
+  </p:timing>
 </p:sld>
 </file>
 
@@ -10600,8 +13420,8 @@
         </p:nvSpPr>
         <p:spPr>
           <a:xfrm>
-            <a:off x="0" y="1440612"/>
-            <a:ext cx="10412083" cy="1173192"/>
+            <a:off x="77638" y="1400340"/>
+            <a:ext cx="10318114" cy="1147551"/>
           </a:xfrm>
           <a:prstGeom prst="rect">
             <a:avLst/>
@@ -11023,6 +13843,300 @@
   <p:clrMapOvr>
     <a:masterClrMapping/>
   </p:clrMapOvr>
+  <p:timing>
+    <p:tnLst>
+      <p:par>
+        <p:cTn id="1" dur="indefinite" restart="never" nodeType="tmRoot">
+          <p:childTnLst>
+            <p:seq concurrent="1" nextAc="seek">
+              <p:cTn id="2" dur="indefinite" nodeType="mainSeq">
+                <p:childTnLst>
+                  <p:par>
+                    <p:cTn id="3" fill="hold">
+                      <p:stCondLst>
+                        <p:cond delay="indefinite"/>
+                      </p:stCondLst>
+                      <p:childTnLst>
+                        <p:par>
+                          <p:cTn id="4" fill="hold">
+                            <p:stCondLst>
+                              <p:cond delay="0"/>
+                            </p:stCondLst>
+                            <p:childTnLst>
+                              <p:par>
+                                <p:cTn id="5" presetID="10" presetClass="entr" presetSubtype="0" fill="hold" grpId="0" nodeType="clickEffect">
+                                  <p:stCondLst>
+                                    <p:cond delay="0"/>
+                                  </p:stCondLst>
+                                  <p:childTnLst>
+                                    <p:set>
+                                      <p:cBhvr>
+                                        <p:cTn id="6" dur="1" fill="hold">
+                                          <p:stCondLst>
+                                            <p:cond delay="0"/>
+                                          </p:stCondLst>
+                                        </p:cTn>
+                                        <p:tgtEl>
+                                          <p:spTgt spid="2"/>
+                                        </p:tgtEl>
+                                        <p:attrNameLst>
+                                          <p:attrName>style.visibility</p:attrName>
+                                        </p:attrNameLst>
+                                      </p:cBhvr>
+                                      <p:to>
+                                        <p:strVal val="visible"/>
+                                      </p:to>
+                                    </p:set>
+                                    <p:animEffect transition="in" filter="fade">
+                                      <p:cBhvr>
+                                        <p:cTn id="7" dur="500"/>
+                                        <p:tgtEl>
+                                          <p:spTgt spid="2"/>
+                                        </p:tgtEl>
+                                      </p:cBhvr>
+                                    </p:animEffect>
+                                  </p:childTnLst>
+                                </p:cTn>
+                              </p:par>
+                            </p:childTnLst>
+                          </p:cTn>
+                        </p:par>
+                      </p:childTnLst>
+                    </p:cTn>
+                  </p:par>
+                  <p:par>
+                    <p:cTn id="8" fill="hold">
+                      <p:stCondLst>
+                        <p:cond delay="indefinite"/>
+                      </p:stCondLst>
+                      <p:childTnLst>
+                        <p:par>
+                          <p:cTn id="9" fill="hold">
+                            <p:stCondLst>
+                              <p:cond delay="0"/>
+                            </p:stCondLst>
+                            <p:childTnLst>
+                              <p:par>
+                                <p:cTn id="10" presetID="1" presetClass="entr" presetSubtype="0" fill="hold" grpId="0" nodeType="clickEffect">
+                                  <p:stCondLst>
+                                    <p:cond delay="0"/>
+                                  </p:stCondLst>
+                                  <p:childTnLst>
+                                    <p:set>
+                                      <p:cBhvr>
+                                        <p:cTn id="11" dur="1" fill="hold">
+                                          <p:stCondLst>
+                                            <p:cond delay="0"/>
+                                          </p:stCondLst>
+                                        </p:cTn>
+                                        <p:tgtEl>
+                                          <p:spTgt spid="3"/>
+                                        </p:tgtEl>
+                                        <p:attrNameLst>
+                                          <p:attrName>style.visibility</p:attrName>
+                                        </p:attrNameLst>
+                                      </p:cBhvr>
+                                      <p:to>
+                                        <p:strVal val="visible"/>
+                                      </p:to>
+                                    </p:set>
+                                  </p:childTnLst>
+                                </p:cTn>
+                              </p:par>
+                            </p:childTnLst>
+                          </p:cTn>
+                        </p:par>
+                      </p:childTnLst>
+                    </p:cTn>
+                  </p:par>
+                  <p:par>
+                    <p:cTn id="12" fill="hold">
+                      <p:stCondLst>
+                        <p:cond delay="indefinite"/>
+                      </p:stCondLst>
+                      <p:childTnLst>
+                        <p:par>
+                          <p:cTn id="13" fill="hold">
+                            <p:stCondLst>
+                              <p:cond delay="0"/>
+                            </p:stCondLst>
+                            <p:childTnLst>
+                              <p:par>
+                                <p:cTn id="14" presetID="10" presetClass="entr" presetSubtype="0" fill="hold" grpId="0" nodeType="clickEffect">
+                                  <p:stCondLst>
+                                    <p:cond delay="0"/>
+                                  </p:stCondLst>
+                                  <p:childTnLst>
+                                    <p:set>
+                                      <p:cBhvr>
+                                        <p:cTn id="15" dur="1" fill="hold">
+                                          <p:stCondLst>
+                                            <p:cond delay="0"/>
+                                          </p:stCondLst>
+                                        </p:cTn>
+                                        <p:tgtEl>
+                                          <p:spTgt spid="5"/>
+                                        </p:tgtEl>
+                                        <p:attrNameLst>
+                                          <p:attrName>style.visibility</p:attrName>
+                                        </p:attrNameLst>
+                                      </p:cBhvr>
+                                      <p:to>
+                                        <p:strVal val="visible"/>
+                                      </p:to>
+                                    </p:set>
+                                    <p:animEffect transition="in" filter="fade">
+                                      <p:cBhvr>
+                                        <p:cTn id="16" dur="500"/>
+                                        <p:tgtEl>
+                                          <p:spTgt spid="5"/>
+                                        </p:tgtEl>
+                                      </p:cBhvr>
+                                    </p:animEffect>
+                                  </p:childTnLst>
+                                </p:cTn>
+                              </p:par>
+                            </p:childTnLst>
+                          </p:cTn>
+                        </p:par>
+                      </p:childTnLst>
+                    </p:cTn>
+                  </p:par>
+                  <p:par>
+                    <p:cTn id="17" fill="hold">
+                      <p:stCondLst>
+                        <p:cond delay="indefinite"/>
+                      </p:stCondLst>
+                      <p:childTnLst>
+                        <p:par>
+                          <p:cTn id="18" fill="hold">
+                            <p:stCondLst>
+                              <p:cond delay="0"/>
+                            </p:stCondLst>
+                            <p:childTnLst>
+                              <p:par>
+                                <p:cTn id="19" presetID="10" presetClass="entr" presetSubtype="0" fill="hold" grpId="0" nodeType="clickEffect">
+                                  <p:stCondLst>
+                                    <p:cond delay="0"/>
+                                  </p:stCondLst>
+                                  <p:childTnLst>
+                                    <p:set>
+                                      <p:cBhvr>
+                                        <p:cTn id="20" dur="1" fill="hold">
+                                          <p:stCondLst>
+                                            <p:cond delay="0"/>
+                                          </p:stCondLst>
+                                        </p:cTn>
+                                        <p:tgtEl>
+                                          <p:spTgt spid="6"/>
+                                        </p:tgtEl>
+                                        <p:attrNameLst>
+                                          <p:attrName>style.visibility</p:attrName>
+                                        </p:attrNameLst>
+                                      </p:cBhvr>
+                                      <p:to>
+                                        <p:strVal val="visible"/>
+                                      </p:to>
+                                    </p:set>
+                                    <p:animEffect transition="in" filter="fade">
+                                      <p:cBhvr>
+                                        <p:cTn id="21" dur="500"/>
+                                        <p:tgtEl>
+                                          <p:spTgt spid="6"/>
+                                        </p:tgtEl>
+                                      </p:cBhvr>
+                                    </p:animEffect>
+                                  </p:childTnLst>
+                                </p:cTn>
+                              </p:par>
+                            </p:childTnLst>
+                          </p:cTn>
+                        </p:par>
+                      </p:childTnLst>
+                    </p:cTn>
+                  </p:par>
+                  <p:par>
+                    <p:cTn id="22" fill="hold">
+                      <p:stCondLst>
+                        <p:cond delay="indefinite"/>
+                      </p:stCondLst>
+                      <p:childTnLst>
+                        <p:par>
+                          <p:cTn id="23" fill="hold">
+                            <p:stCondLst>
+                              <p:cond delay="0"/>
+                            </p:stCondLst>
+                            <p:childTnLst>
+                              <p:par>
+                                <p:cTn id="24" presetID="10" presetClass="entr" presetSubtype="0" fill="hold" grpId="0" nodeType="clickEffect">
+                                  <p:stCondLst>
+                                    <p:cond delay="0"/>
+                                  </p:stCondLst>
+                                  <p:childTnLst>
+                                    <p:set>
+                                      <p:cBhvr>
+                                        <p:cTn id="25" dur="1" fill="hold">
+                                          <p:stCondLst>
+                                            <p:cond delay="0"/>
+                                          </p:stCondLst>
+                                        </p:cTn>
+                                        <p:tgtEl>
+                                          <p:spTgt spid="7"/>
+                                        </p:tgtEl>
+                                        <p:attrNameLst>
+                                          <p:attrName>style.visibility</p:attrName>
+                                        </p:attrNameLst>
+                                      </p:cBhvr>
+                                      <p:to>
+                                        <p:strVal val="visible"/>
+                                      </p:to>
+                                    </p:set>
+                                    <p:animEffect transition="in" filter="fade">
+                                      <p:cBhvr>
+                                        <p:cTn id="26" dur="500"/>
+                                        <p:tgtEl>
+                                          <p:spTgt spid="7"/>
+                                        </p:tgtEl>
+                                      </p:cBhvr>
+                                    </p:animEffect>
+                                  </p:childTnLst>
+                                </p:cTn>
+                              </p:par>
+                            </p:childTnLst>
+                          </p:cTn>
+                        </p:par>
+                      </p:childTnLst>
+                    </p:cTn>
+                  </p:par>
+                </p:childTnLst>
+              </p:cTn>
+              <p:prevCondLst>
+                <p:cond evt="onPrev" delay="0">
+                  <p:tgtEl>
+                    <p:sldTgt/>
+                  </p:tgtEl>
+                </p:cond>
+              </p:prevCondLst>
+              <p:nextCondLst>
+                <p:cond evt="onNext" delay="0">
+                  <p:tgtEl>
+                    <p:sldTgt/>
+                  </p:tgtEl>
+                </p:cond>
+              </p:nextCondLst>
+            </p:seq>
+          </p:childTnLst>
+        </p:cTn>
+      </p:par>
+    </p:tnLst>
+    <p:bldLst>
+      <p:bldP spid="2" grpId="0"/>
+      <p:bldP spid="3" grpId="0" animBg="1"/>
+      <p:bldP spid="5" grpId="0"/>
+      <p:bldP spid="6" grpId="0" animBg="1"/>
+      <p:bldP spid="7" grpId="0"/>
+    </p:bldLst>
+  </p:timing>
 </p:sld>
 </file>
 
@@ -11192,6 +14306,92 @@
   <p:clrMapOvr>
     <a:masterClrMapping/>
   </p:clrMapOvr>
+  <p:timing>
+    <p:tnLst>
+      <p:par>
+        <p:cTn id="1" dur="indefinite" restart="never" nodeType="tmRoot">
+          <p:childTnLst>
+            <p:seq concurrent="1" nextAc="seek">
+              <p:cTn id="2" dur="indefinite" nodeType="mainSeq">
+                <p:childTnLst>
+                  <p:par>
+                    <p:cTn id="3" fill="hold">
+                      <p:stCondLst>
+                        <p:cond delay="indefinite"/>
+                      </p:stCondLst>
+                      <p:childTnLst>
+                        <p:par>
+                          <p:cTn id="4" fill="hold">
+                            <p:stCondLst>
+                              <p:cond delay="0"/>
+                            </p:stCondLst>
+                            <p:childTnLst>
+                              <p:par>
+                                <p:cTn id="5" presetID="10" presetClass="entr" presetSubtype="0" fill="hold" grpId="0" nodeType="clickEffect">
+                                  <p:stCondLst>
+                                    <p:cond delay="0"/>
+                                  </p:stCondLst>
+                                  <p:childTnLst>
+                                    <p:set>
+                                      <p:cBhvr>
+                                        <p:cTn id="6" dur="1" fill="hold">
+                                          <p:stCondLst>
+                                            <p:cond delay="0"/>
+                                          </p:stCondLst>
+                                        </p:cTn>
+                                        <p:tgtEl>
+                                          <p:spTgt spid="3"/>
+                                        </p:tgtEl>
+                                        <p:attrNameLst>
+                                          <p:attrName>style.visibility</p:attrName>
+                                        </p:attrNameLst>
+                                      </p:cBhvr>
+                                      <p:to>
+                                        <p:strVal val="visible"/>
+                                      </p:to>
+                                    </p:set>
+                                    <p:animEffect transition="in" filter="fade">
+                                      <p:cBhvr>
+                                        <p:cTn id="7" dur="500"/>
+                                        <p:tgtEl>
+                                          <p:spTgt spid="3"/>
+                                        </p:tgtEl>
+                                      </p:cBhvr>
+                                    </p:animEffect>
+                                  </p:childTnLst>
+                                </p:cTn>
+                              </p:par>
+                            </p:childTnLst>
+                          </p:cTn>
+                        </p:par>
+                      </p:childTnLst>
+                    </p:cTn>
+                  </p:par>
+                </p:childTnLst>
+              </p:cTn>
+              <p:prevCondLst>
+                <p:cond evt="onPrev" delay="0">
+                  <p:tgtEl>
+                    <p:sldTgt/>
+                  </p:tgtEl>
+                </p:cond>
+              </p:prevCondLst>
+              <p:nextCondLst>
+                <p:cond evt="onNext" delay="0">
+                  <p:tgtEl>
+                    <p:sldTgt/>
+                  </p:tgtEl>
+                </p:cond>
+              </p:nextCondLst>
+            </p:seq>
+          </p:childTnLst>
+        </p:cTn>
+      </p:par>
+    </p:tnLst>
+    <p:bldLst>
+      <p:bldP spid="3" grpId="0"/>
+    </p:bldLst>
+  </p:timing>
 </p:sld>
 </file>
 
@@ -11797,6 +14997,200 @@
   <p:clrMapOvr>
     <a:masterClrMapping/>
   </p:clrMapOvr>
+  <p:timing>
+    <p:tnLst>
+      <p:par>
+        <p:cTn id="1" dur="indefinite" restart="never" nodeType="tmRoot">
+          <p:childTnLst>
+            <p:seq concurrent="1" nextAc="seek">
+              <p:cTn id="2" dur="indefinite" nodeType="mainSeq">
+                <p:childTnLst>
+                  <p:par>
+                    <p:cTn id="3" fill="hold">
+                      <p:stCondLst>
+                        <p:cond delay="indefinite"/>
+                      </p:stCondLst>
+                      <p:childTnLst>
+                        <p:par>
+                          <p:cTn id="4" fill="hold">
+                            <p:stCondLst>
+                              <p:cond delay="0"/>
+                            </p:stCondLst>
+                            <p:childTnLst>
+                              <p:par>
+                                <p:cTn id="5" presetID="10" presetClass="entr" presetSubtype="0" fill="hold" grpId="0" nodeType="clickEffect">
+                                  <p:stCondLst>
+                                    <p:cond delay="0"/>
+                                  </p:stCondLst>
+                                  <p:childTnLst>
+                                    <p:set>
+                                      <p:cBhvr>
+                                        <p:cTn id="6" dur="1" fill="hold">
+                                          <p:stCondLst>
+                                            <p:cond delay="0"/>
+                                          </p:stCondLst>
+                                        </p:cTn>
+                                        <p:tgtEl>
+                                          <p:spTgt spid="3"/>
+                                        </p:tgtEl>
+                                        <p:attrNameLst>
+                                          <p:attrName>style.visibility</p:attrName>
+                                        </p:attrNameLst>
+                                      </p:cBhvr>
+                                      <p:to>
+                                        <p:strVal val="visible"/>
+                                      </p:to>
+                                    </p:set>
+                                    <p:animEffect transition="in" filter="fade">
+                                      <p:cBhvr>
+                                        <p:cTn id="7" dur="500"/>
+                                        <p:tgtEl>
+                                          <p:spTgt spid="3"/>
+                                        </p:tgtEl>
+                                      </p:cBhvr>
+                                    </p:animEffect>
+                                  </p:childTnLst>
+                                </p:cTn>
+                              </p:par>
+                            </p:childTnLst>
+                          </p:cTn>
+                        </p:par>
+                      </p:childTnLst>
+                    </p:cTn>
+                  </p:par>
+                  <p:par>
+                    <p:cTn id="8" fill="hold">
+                      <p:stCondLst>
+                        <p:cond delay="indefinite"/>
+                      </p:stCondLst>
+                      <p:childTnLst>
+                        <p:par>
+                          <p:cTn id="9" fill="hold">
+                            <p:stCondLst>
+                              <p:cond delay="0"/>
+                            </p:stCondLst>
+                            <p:childTnLst>
+                              <p:par>
+                                <p:cTn id="10" presetID="10" presetClass="entr" presetSubtype="0" fill="hold" grpId="0" nodeType="clickEffect">
+                                  <p:stCondLst>
+                                    <p:cond delay="0"/>
+                                  </p:stCondLst>
+                                  <p:childTnLst>
+                                    <p:set>
+                                      <p:cBhvr>
+                                        <p:cTn id="11" dur="1" fill="hold">
+                                          <p:stCondLst>
+                                            <p:cond delay="0"/>
+                                          </p:stCondLst>
+                                        </p:cTn>
+                                        <p:tgtEl>
+                                          <p:spTgt spid="4"/>
+                                        </p:tgtEl>
+                                        <p:attrNameLst>
+                                          <p:attrName>style.visibility</p:attrName>
+                                        </p:attrNameLst>
+                                      </p:cBhvr>
+                                      <p:to>
+                                        <p:strVal val="visible"/>
+                                      </p:to>
+                                    </p:set>
+                                    <p:animEffect transition="in" filter="fade">
+                                      <p:cBhvr>
+                                        <p:cTn id="12" dur="500"/>
+                                        <p:tgtEl>
+                                          <p:spTgt spid="4"/>
+                                        </p:tgtEl>
+                                      </p:cBhvr>
+                                    </p:animEffect>
+                                  </p:childTnLst>
+                                </p:cTn>
+                              </p:par>
+                            </p:childTnLst>
+                          </p:cTn>
+                        </p:par>
+                      </p:childTnLst>
+                    </p:cTn>
+                  </p:par>
+                  <p:par>
+                    <p:cTn id="13" fill="hold">
+                      <p:stCondLst>
+                        <p:cond delay="indefinite"/>
+                      </p:stCondLst>
+                      <p:childTnLst>
+                        <p:par>
+                          <p:cTn id="14" fill="hold">
+                            <p:stCondLst>
+                              <p:cond delay="0"/>
+                            </p:stCondLst>
+                            <p:childTnLst>
+                              <p:par>
+                                <p:cTn id="15" presetID="10" presetClass="entr" presetSubtype="0" fill="hold" grpId="0" nodeType="clickEffect">
+                                  <p:stCondLst>
+                                    <p:cond delay="0"/>
+                                  </p:stCondLst>
+                                  <p:childTnLst>
+                                    <p:set>
+                                      <p:cBhvr>
+                                        <p:cTn id="16" dur="1" fill="hold">
+                                          <p:stCondLst>
+                                            <p:cond delay="0"/>
+                                          </p:stCondLst>
+                                        </p:cTn>
+                                        <p:tgtEl>
+                                          <p:spTgt spid="6"/>
+                                        </p:tgtEl>
+                                        <p:attrNameLst>
+                                          <p:attrName>style.visibility</p:attrName>
+                                        </p:attrNameLst>
+                                      </p:cBhvr>
+                                      <p:to>
+                                        <p:strVal val="visible"/>
+                                      </p:to>
+                                    </p:set>
+                                    <p:animEffect transition="in" filter="fade">
+                                      <p:cBhvr>
+                                        <p:cTn id="17" dur="500"/>
+                                        <p:tgtEl>
+                                          <p:spTgt spid="6"/>
+                                        </p:tgtEl>
+                                      </p:cBhvr>
+                                    </p:animEffect>
+                                  </p:childTnLst>
+                                </p:cTn>
+                              </p:par>
+                            </p:childTnLst>
+                          </p:cTn>
+                        </p:par>
+                      </p:childTnLst>
+                    </p:cTn>
+                  </p:par>
+                </p:childTnLst>
+              </p:cTn>
+              <p:prevCondLst>
+                <p:cond evt="onPrev" delay="0">
+                  <p:tgtEl>
+                    <p:sldTgt/>
+                  </p:tgtEl>
+                </p:cond>
+              </p:prevCondLst>
+              <p:nextCondLst>
+                <p:cond evt="onNext" delay="0">
+                  <p:tgtEl>
+                    <p:sldTgt/>
+                  </p:tgtEl>
+                </p:cond>
+              </p:nextCondLst>
+            </p:seq>
+          </p:childTnLst>
+        </p:cTn>
+      </p:par>
+    </p:tnLst>
+    <p:bldLst>
+      <p:bldP spid="3" grpId="0"/>
+      <p:bldP spid="4" grpId="0" animBg="1"/>
+      <p:bldP spid="6" grpId="0"/>
+    </p:bldLst>
+  </p:timing>
 </p:sld>
 </file>
 

</xml_diff>